<commit_message>
Production 6 format and pdf
</commit_message>
<xml_diff>
--- a/docs/part_6/production_6.pptx
+++ b/docs/part_6/production_6.pptx
@@ -1,9 +1,12 @@
 
 <file path=ppt/presentation.xml><?xml version="1.0" encoding="utf-8"?>
-<p:presentation xmlns:a="http://schemas.openxmlformats.org/drawingml/2006/main" xmlns:p="http://schemas.openxmlformats.org/presentationml/2006/main" xmlns:r="http://schemas.openxmlformats.org/officeDocument/2006/relationships" saveSubsetFonts="1">
+<p:presentation xmlns:a="http://schemas.openxmlformats.org/drawingml/2006/main" xmlns:r="http://schemas.openxmlformats.org/officeDocument/2006/relationships" xmlns:p="http://schemas.openxmlformats.org/presentationml/2006/main" showSpecialPlsOnTitleSld="0" saveSubsetFonts="1">
   <p:sldMasterIdLst>
     <p:sldMasterId id="2147484296" r:id="rId1"/>
   </p:sldMasterIdLst>
+  <p:notesMasterIdLst>
+    <p:notesMasterId r:id="rId16"/>
+  </p:notesMasterIdLst>
   <p:sldIdLst>
     <p:sldId id="256" r:id="rId2"/>
     <p:sldId id="257" r:id="rId3"/>
@@ -16,6 +19,9 @@
     <p:sldId id="264" r:id="rId10"/>
     <p:sldId id="265" r:id="rId11"/>
     <p:sldId id="266" r:id="rId12"/>
+    <p:sldId id="267" r:id="rId13"/>
+    <p:sldId id="268" r:id="rId14"/>
+    <p:sldId id="269" r:id="rId15"/>
   </p:sldIdLst>
   <p:sldSz cx="12192000" cy="6858000"/>
   <p:notesSz cx="6858000" cy="9144000"/>
@@ -23,8 +29,8 @@
     <a:defPPr>
       <a:defRPr lang="en-US"/>
     </a:defPPr>
-    <a:lvl1pPr algn="l" defTabSz="457200" eaLnBrk="1" hangingPunct="1" latinLnBrk="0" marL="0" rtl="0">
-      <a:defRPr kern="1200" sz="1800">
+    <a:lvl1pPr marL="0" algn="l" defTabSz="457200" rtl="0" eaLnBrk="1" latinLnBrk="0" hangingPunct="1">
+      <a:defRPr sz="1800" kern="1200">
         <a:solidFill>
           <a:schemeClr val="tx1"/>
         </a:solidFill>
@@ -33,8 +39,8 @@
         <a:cs typeface="+mn-cs"/>
       </a:defRPr>
     </a:lvl1pPr>
-    <a:lvl2pPr algn="l" defTabSz="457200" eaLnBrk="1" hangingPunct="1" latinLnBrk="0" marL="457200" rtl="0">
-      <a:defRPr kern="1200" sz="1800">
+    <a:lvl2pPr marL="457200" algn="l" defTabSz="457200" rtl="0" eaLnBrk="1" latinLnBrk="0" hangingPunct="1">
+      <a:defRPr sz="1800" kern="1200">
         <a:solidFill>
           <a:schemeClr val="tx1"/>
         </a:solidFill>
@@ -43,8 +49,8 @@
         <a:cs typeface="+mn-cs"/>
       </a:defRPr>
     </a:lvl2pPr>
-    <a:lvl3pPr algn="l" defTabSz="457200" eaLnBrk="1" hangingPunct="1" latinLnBrk="0" marL="914400" rtl="0">
-      <a:defRPr kern="1200" sz="1800">
+    <a:lvl3pPr marL="914400" algn="l" defTabSz="457200" rtl="0" eaLnBrk="1" latinLnBrk="0" hangingPunct="1">
+      <a:defRPr sz="1800" kern="1200">
         <a:solidFill>
           <a:schemeClr val="tx1"/>
         </a:solidFill>
@@ -53,8 +59,8 @@
         <a:cs typeface="+mn-cs"/>
       </a:defRPr>
     </a:lvl3pPr>
-    <a:lvl4pPr algn="l" defTabSz="457200" eaLnBrk="1" hangingPunct="1" latinLnBrk="0" marL="1371600" rtl="0">
-      <a:defRPr kern="1200" sz="1800">
+    <a:lvl4pPr marL="1371600" algn="l" defTabSz="457200" rtl="0" eaLnBrk="1" latinLnBrk="0" hangingPunct="1">
+      <a:defRPr sz="1800" kern="1200">
         <a:solidFill>
           <a:schemeClr val="tx1"/>
         </a:solidFill>
@@ -63,8 +69,8 @@
         <a:cs typeface="+mn-cs"/>
       </a:defRPr>
     </a:lvl4pPr>
-    <a:lvl5pPr algn="l" defTabSz="457200" eaLnBrk="1" hangingPunct="1" latinLnBrk="0" marL="1828800" rtl="0">
-      <a:defRPr kern="1200" sz="1800">
+    <a:lvl5pPr marL="1828800" algn="l" defTabSz="457200" rtl="0" eaLnBrk="1" latinLnBrk="0" hangingPunct="1">
+      <a:defRPr sz="1800" kern="1200">
         <a:solidFill>
           <a:schemeClr val="tx1"/>
         </a:solidFill>
@@ -73,8 +79,8 @@
         <a:cs typeface="+mn-cs"/>
       </a:defRPr>
     </a:lvl5pPr>
-    <a:lvl6pPr algn="l" defTabSz="457200" eaLnBrk="1" hangingPunct="1" latinLnBrk="0" marL="2286000" rtl="0">
-      <a:defRPr kern="1200" sz="1800">
+    <a:lvl6pPr marL="2286000" algn="l" defTabSz="457200" rtl="0" eaLnBrk="1" latinLnBrk="0" hangingPunct="1">
+      <a:defRPr sz="1800" kern="1200">
         <a:solidFill>
           <a:schemeClr val="tx1"/>
         </a:solidFill>
@@ -83,8 +89,8 @@
         <a:cs typeface="+mn-cs"/>
       </a:defRPr>
     </a:lvl6pPr>
-    <a:lvl7pPr algn="l" defTabSz="457200" eaLnBrk="1" hangingPunct="1" latinLnBrk="0" marL="2743200" rtl="0">
-      <a:defRPr kern="1200" sz="1800">
+    <a:lvl7pPr marL="2743200" algn="l" defTabSz="457200" rtl="0" eaLnBrk="1" latinLnBrk="0" hangingPunct="1">
+      <a:defRPr sz="1800" kern="1200">
         <a:solidFill>
           <a:schemeClr val="tx1"/>
         </a:solidFill>
@@ -93,8 +99,8 @@
         <a:cs typeface="+mn-cs"/>
       </a:defRPr>
     </a:lvl7pPr>
-    <a:lvl8pPr algn="l" defTabSz="457200" eaLnBrk="1" hangingPunct="1" latinLnBrk="0" marL="3200400" rtl="0">
-      <a:defRPr kern="1200" sz="1800">
+    <a:lvl8pPr marL="3200400" algn="l" defTabSz="457200" rtl="0" eaLnBrk="1" latinLnBrk="0" hangingPunct="1">
+      <a:defRPr sz="1800" kern="1200">
         <a:solidFill>
           <a:schemeClr val="tx1"/>
         </a:solidFill>
@@ -103,8 +109,8 @@
         <a:cs typeface="+mn-cs"/>
       </a:defRPr>
     </a:lvl8pPr>
-    <a:lvl9pPr algn="l" defTabSz="457200" eaLnBrk="1" hangingPunct="1" latinLnBrk="0" marL="3657600" rtl="0">
-      <a:defRPr kern="1200" sz="1800">
+    <a:lvl9pPr marL="3657600" algn="l" defTabSz="457200" rtl="0" eaLnBrk="1" latinLnBrk="0" hangingPunct="1">
+      <a:defRPr sz="1800" kern="1200">
         <a:solidFill>
           <a:schemeClr val="tx1"/>
         </a:solidFill>
@@ -120,6 +126,356 @@
     </p:ext>
   </p:extLst>
 </p:presentation>
+</file>
+
+<file path=ppt/notesMasters/notesMaster1.xml><?xml version="1.0" encoding="utf-8"?>
+<p:notesMaster xmlns:a="http://schemas.openxmlformats.org/drawingml/2006/main" xmlns:r="http://schemas.openxmlformats.org/officeDocument/2006/relationships" xmlns:p="http://schemas.openxmlformats.org/presentationml/2006/main">
+  <p:cSld>
+    <p:bg>
+      <p:bgRef idx="1001">
+        <a:schemeClr val="bg1"/>
+      </p:bgRef>
+    </p:bg>
+    <p:spTree>
+      <p:nvGrpSpPr>
+        <p:cNvPr id="1" name=""/>
+        <p:cNvGrpSpPr/>
+        <p:nvPr/>
+      </p:nvGrpSpPr>
+      <p:grpSpPr>
+        <a:xfrm>
+          <a:off x="0" y="0"/>
+          <a:ext cx="0" cy="0"/>
+          <a:chOff x="0" y="0"/>
+          <a:chExt cx="0" cy="0"/>
+        </a:xfrm>
+      </p:grpSpPr>
+      <p:sp>
+        <p:nvSpPr>
+          <p:cNvPr id="2" name="Header Placeholder 1"/>
+          <p:cNvSpPr>
+            <a:spLocks noGrp="1"/>
+          </p:cNvSpPr>
+          <p:nvPr>
+            <p:ph type="hdr" sz="quarter"/>
+          </p:nvPr>
+        </p:nvSpPr>
+        <p:spPr>
+          <a:xfrm>
+            <a:off x="0" y="0"/>
+            <a:ext cx="2971800" cy="458788"/>
+          </a:xfrm>
+          <a:prstGeom prst="rect">
+            <a:avLst/>
+          </a:prstGeom>
+        </p:spPr>
+        <p:txBody>
+          <a:bodyPr vert="horz" lIns="91440" tIns="45720" rIns="91440" bIns="45720" rtlCol="0"/>
+          <a:lstStyle>
+            <a:lvl1pPr algn="l">
+              <a:defRPr sz="1200"/>
+            </a:lvl1pPr>
+          </a:lstStyle>
+          <a:p>
+            <a:endParaRPr lang="en-CA"/>
+          </a:p>
+        </p:txBody>
+      </p:sp>
+      <p:sp>
+        <p:nvSpPr>
+          <p:cNvPr id="3" name="Date Placeholder 2"/>
+          <p:cNvSpPr>
+            <a:spLocks noGrp="1"/>
+          </p:cNvSpPr>
+          <p:nvPr>
+            <p:ph type="dt" idx="1"/>
+          </p:nvPr>
+        </p:nvSpPr>
+        <p:spPr>
+          <a:xfrm>
+            <a:off x="3884613" y="0"/>
+            <a:ext cx="2971800" cy="458788"/>
+          </a:xfrm>
+          <a:prstGeom prst="rect">
+            <a:avLst/>
+          </a:prstGeom>
+        </p:spPr>
+        <p:txBody>
+          <a:bodyPr vert="horz" lIns="91440" tIns="45720" rIns="91440" bIns="45720" rtlCol="0"/>
+          <a:lstStyle>
+            <a:lvl1pPr algn="r">
+              <a:defRPr sz="1200"/>
+            </a:lvl1pPr>
+          </a:lstStyle>
+          <a:p>
+            <a:fld id="{B4CC9AED-037B-4DC4-9BCA-D0227154E96D}" type="datetimeFigureOut">
+              <a:rPr lang="en-CA" smtClean="0"/>
+              <a:t>2024-03-03</a:t>
+            </a:fld>
+            <a:endParaRPr lang="en-CA"/>
+          </a:p>
+        </p:txBody>
+      </p:sp>
+      <p:sp>
+        <p:nvSpPr>
+          <p:cNvPr id="4" name="Slide Image Placeholder 3"/>
+          <p:cNvSpPr>
+            <a:spLocks noGrp="1" noRot="1" noChangeAspect="1"/>
+          </p:cNvSpPr>
+          <p:nvPr>
+            <p:ph type="sldImg" idx="2"/>
+          </p:nvPr>
+        </p:nvSpPr>
+        <p:spPr>
+          <a:xfrm>
+            <a:off x="685800" y="1143000"/>
+            <a:ext cx="5486400" cy="3086100"/>
+          </a:xfrm>
+          <a:prstGeom prst="rect">
+            <a:avLst/>
+          </a:prstGeom>
+          <a:noFill/>
+          <a:ln w="12700">
+            <a:solidFill>
+              <a:prstClr val="black"/>
+            </a:solidFill>
+          </a:ln>
+        </p:spPr>
+        <p:txBody>
+          <a:bodyPr vert="horz" lIns="91440" tIns="45720" rIns="91440" bIns="45720" rtlCol="0" anchor="ctr"/>
+          <a:lstStyle/>
+          <a:p>
+            <a:endParaRPr lang="en-CA"/>
+          </a:p>
+        </p:txBody>
+      </p:sp>
+      <p:sp>
+        <p:nvSpPr>
+          <p:cNvPr id="5" name="Notes Placeholder 4"/>
+          <p:cNvSpPr>
+            <a:spLocks noGrp="1"/>
+          </p:cNvSpPr>
+          <p:nvPr>
+            <p:ph type="body" sz="quarter" idx="3"/>
+          </p:nvPr>
+        </p:nvSpPr>
+        <p:spPr>
+          <a:xfrm>
+            <a:off x="685800" y="4400550"/>
+            <a:ext cx="5486400" cy="3600450"/>
+          </a:xfrm>
+          <a:prstGeom prst="rect">
+            <a:avLst/>
+          </a:prstGeom>
+        </p:spPr>
+        <p:txBody>
+          <a:bodyPr vert="horz" lIns="91440" tIns="45720" rIns="91440" bIns="45720" rtlCol="0"/>
+          <a:lstStyle/>
+          <a:p>
+            <a:pPr lvl="0"/>
+            <a:r>
+              <a:rPr lang="en-US"/>
+              <a:t>Click to edit Master text styles</a:t>
+            </a:r>
+          </a:p>
+          <a:p>
+            <a:pPr lvl="1"/>
+            <a:r>
+              <a:rPr lang="en-US"/>
+              <a:t>Second level</a:t>
+            </a:r>
+          </a:p>
+          <a:p>
+            <a:pPr lvl="2"/>
+            <a:r>
+              <a:rPr lang="en-US"/>
+              <a:t>Third level</a:t>
+            </a:r>
+          </a:p>
+          <a:p>
+            <a:pPr lvl="3"/>
+            <a:r>
+              <a:rPr lang="en-US"/>
+              <a:t>Fourth level</a:t>
+            </a:r>
+          </a:p>
+          <a:p>
+            <a:pPr lvl="4"/>
+            <a:r>
+              <a:rPr lang="en-US"/>
+              <a:t>Fifth level</a:t>
+            </a:r>
+            <a:endParaRPr lang="en-CA"/>
+          </a:p>
+        </p:txBody>
+      </p:sp>
+      <p:sp>
+        <p:nvSpPr>
+          <p:cNvPr id="6" name="Footer Placeholder 5"/>
+          <p:cNvSpPr>
+            <a:spLocks noGrp="1"/>
+          </p:cNvSpPr>
+          <p:nvPr>
+            <p:ph type="ftr" sz="quarter" idx="4"/>
+          </p:nvPr>
+        </p:nvSpPr>
+        <p:spPr>
+          <a:xfrm>
+            <a:off x="0" y="8685213"/>
+            <a:ext cx="2971800" cy="458787"/>
+          </a:xfrm>
+          <a:prstGeom prst="rect">
+            <a:avLst/>
+          </a:prstGeom>
+        </p:spPr>
+        <p:txBody>
+          <a:bodyPr vert="horz" lIns="91440" tIns="45720" rIns="91440" bIns="45720" rtlCol="0" anchor="b"/>
+          <a:lstStyle>
+            <a:lvl1pPr algn="l">
+              <a:defRPr sz="1200"/>
+            </a:lvl1pPr>
+          </a:lstStyle>
+          <a:p>
+            <a:endParaRPr lang="en-CA"/>
+          </a:p>
+        </p:txBody>
+      </p:sp>
+      <p:sp>
+        <p:nvSpPr>
+          <p:cNvPr id="7" name="Slide Number Placeholder 6"/>
+          <p:cNvSpPr>
+            <a:spLocks noGrp="1"/>
+          </p:cNvSpPr>
+          <p:nvPr>
+            <p:ph type="sldNum" sz="quarter" idx="5"/>
+          </p:nvPr>
+        </p:nvSpPr>
+        <p:spPr>
+          <a:xfrm>
+            <a:off x="3884613" y="8685213"/>
+            <a:ext cx="2971800" cy="458787"/>
+          </a:xfrm>
+          <a:prstGeom prst="rect">
+            <a:avLst/>
+          </a:prstGeom>
+        </p:spPr>
+        <p:txBody>
+          <a:bodyPr vert="horz" lIns="91440" tIns="45720" rIns="91440" bIns="45720" rtlCol="0" anchor="b"/>
+          <a:lstStyle>
+            <a:lvl1pPr algn="r">
+              <a:defRPr sz="1200"/>
+            </a:lvl1pPr>
+          </a:lstStyle>
+          <a:p>
+            <a:fld id="{69CDEB68-F46E-4F85-B17C-799321E5D0FF}" type="slidenum">
+              <a:rPr lang="en-CA" smtClean="0"/>
+              <a:t>‹#›</a:t>
+            </a:fld>
+            <a:endParaRPr lang="en-CA"/>
+          </a:p>
+        </p:txBody>
+      </p:sp>
+    </p:spTree>
+    <p:extLst>
+      <p:ext uri="{BB962C8B-B14F-4D97-AF65-F5344CB8AC3E}">
+        <p14:creationId xmlns:p14="http://schemas.microsoft.com/office/powerpoint/2010/main" val="279039411"/>
+      </p:ext>
+    </p:extLst>
+  </p:cSld>
+  <p:clrMap bg1="lt1" tx1="dk1" bg2="lt2" tx2="dk2" accent1="accent1" accent2="accent2" accent3="accent3" accent4="accent4" accent5="accent5" accent6="accent6" hlink="hlink" folHlink="folHlink"/>
+  <p:notesStyle>
+    <a:lvl1pPr marL="0" algn="l" defTabSz="914400" rtl="0" eaLnBrk="1" latinLnBrk="0" hangingPunct="1">
+      <a:defRPr sz="1200" kern="1200">
+        <a:solidFill>
+          <a:schemeClr val="tx1"/>
+        </a:solidFill>
+        <a:latin typeface="+mn-lt"/>
+        <a:ea typeface="+mn-ea"/>
+        <a:cs typeface="+mn-cs"/>
+      </a:defRPr>
+    </a:lvl1pPr>
+    <a:lvl2pPr marL="457200" algn="l" defTabSz="914400" rtl="0" eaLnBrk="1" latinLnBrk="0" hangingPunct="1">
+      <a:defRPr sz="1200" kern="1200">
+        <a:solidFill>
+          <a:schemeClr val="tx1"/>
+        </a:solidFill>
+        <a:latin typeface="+mn-lt"/>
+        <a:ea typeface="+mn-ea"/>
+        <a:cs typeface="+mn-cs"/>
+      </a:defRPr>
+    </a:lvl2pPr>
+    <a:lvl3pPr marL="914400" algn="l" defTabSz="914400" rtl="0" eaLnBrk="1" latinLnBrk="0" hangingPunct="1">
+      <a:defRPr sz="1200" kern="1200">
+        <a:solidFill>
+          <a:schemeClr val="tx1"/>
+        </a:solidFill>
+        <a:latin typeface="+mn-lt"/>
+        <a:ea typeface="+mn-ea"/>
+        <a:cs typeface="+mn-cs"/>
+      </a:defRPr>
+    </a:lvl3pPr>
+    <a:lvl4pPr marL="1371600" algn="l" defTabSz="914400" rtl="0" eaLnBrk="1" latinLnBrk="0" hangingPunct="1">
+      <a:defRPr sz="1200" kern="1200">
+        <a:solidFill>
+          <a:schemeClr val="tx1"/>
+        </a:solidFill>
+        <a:latin typeface="+mn-lt"/>
+        <a:ea typeface="+mn-ea"/>
+        <a:cs typeface="+mn-cs"/>
+      </a:defRPr>
+    </a:lvl4pPr>
+    <a:lvl5pPr marL="1828800" algn="l" defTabSz="914400" rtl="0" eaLnBrk="1" latinLnBrk="0" hangingPunct="1">
+      <a:defRPr sz="1200" kern="1200">
+        <a:solidFill>
+          <a:schemeClr val="tx1"/>
+        </a:solidFill>
+        <a:latin typeface="+mn-lt"/>
+        <a:ea typeface="+mn-ea"/>
+        <a:cs typeface="+mn-cs"/>
+      </a:defRPr>
+    </a:lvl5pPr>
+    <a:lvl6pPr marL="2286000" algn="l" defTabSz="914400" rtl="0" eaLnBrk="1" latinLnBrk="0" hangingPunct="1">
+      <a:defRPr sz="1200" kern="1200">
+        <a:solidFill>
+          <a:schemeClr val="tx1"/>
+        </a:solidFill>
+        <a:latin typeface="+mn-lt"/>
+        <a:ea typeface="+mn-ea"/>
+        <a:cs typeface="+mn-cs"/>
+      </a:defRPr>
+    </a:lvl6pPr>
+    <a:lvl7pPr marL="2743200" algn="l" defTabSz="914400" rtl="0" eaLnBrk="1" latinLnBrk="0" hangingPunct="1">
+      <a:defRPr sz="1200" kern="1200">
+        <a:solidFill>
+          <a:schemeClr val="tx1"/>
+        </a:solidFill>
+        <a:latin typeface="+mn-lt"/>
+        <a:ea typeface="+mn-ea"/>
+        <a:cs typeface="+mn-cs"/>
+      </a:defRPr>
+    </a:lvl7pPr>
+    <a:lvl8pPr marL="3200400" algn="l" defTabSz="914400" rtl="0" eaLnBrk="1" latinLnBrk="0" hangingPunct="1">
+      <a:defRPr sz="1200" kern="1200">
+        <a:solidFill>
+          <a:schemeClr val="tx1"/>
+        </a:solidFill>
+        <a:latin typeface="+mn-lt"/>
+        <a:ea typeface="+mn-ea"/>
+        <a:cs typeface="+mn-cs"/>
+      </a:defRPr>
+    </a:lvl8pPr>
+    <a:lvl9pPr marL="3657600" algn="l" defTabSz="914400" rtl="0" eaLnBrk="1" latinLnBrk="0" hangingPunct="1">
+      <a:defRPr sz="1200" kern="1200">
+        <a:solidFill>
+          <a:schemeClr val="tx1"/>
+        </a:solidFill>
+        <a:latin typeface="+mn-lt"/>
+        <a:ea typeface="+mn-ea"/>
+        <a:cs typeface="+mn-cs"/>
+      </a:defRPr>
+    </a:lvl9pPr>
+  </p:notesStyle>
+</p:notesMaster>
 </file>
 
 <file path=ppt/slideLayouts/slideLayout1.xml><?xml version="1.0" encoding="utf-8"?>
@@ -318,11 +674,10 @@
             </a:lvl1pPr>
           </a:lstStyle>
           <a:p>
-            <a:fld id="{91E254DF-DAF9-438F-92A9-B044143B9B02}" type="datetimeFigureOut">
-              <a:rPr lang="en-CA" smtClean="0"/>
-              <a:t>2024-02-01</a:t>
-            </a:fld>
-            <a:endParaRPr lang="en-CA"/>
+            <a:r>
+              <a:rPr lang="en-CA"/>
+              <a:t>March 2024</a:t>
+            </a:r>
           </a:p>
         </p:txBody>
       </p:sp>
@@ -351,7 +706,10 @@
             </a:lvl1pPr>
           </a:lstStyle>
           <a:p>
-            <a:endParaRPr lang="en-CA"/>
+            <a:r>
+              <a:rPr lang="en-CA"/>
+              <a:t>Production - Model Deployment</a:t>
+            </a:r>
           </a:p>
         </p:txBody>
       </p:sp>
@@ -508,11 +866,10 @@
           <a:bodyPr/>
           <a:lstStyle/>
           <a:p>
-            <a:fld id="{91E254DF-DAF9-438F-92A9-B044143B9B02}" type="datetimeFigureOut">
-              <a:rPr lang="en-CA" smtClean="0"/>
-              <a:t>2024-02-01</a:t>
-            </a:fld>
-            <a:endParaRPr lang="en-CA"/>
+            <a:r>
+              <a:rPr lang="en-CA"/>
+              <a:t>March 2024</a:t>
+            </a:r>
           </a:p>
         </p:txBody>
       </p:sp>
@@ -531,7 +888,10 @@
           <a:bodyPr/>
           <a:lstStyle/>
           <a:p>
-            <a:endParaRPr lang="en-CA"/>
+            <a:r>
+              <a:rPr lang="en-CA"/>
+              <a:t>Production - Model Deployment</a:t>
+            </a:r>
           </a:p>
         </p:txBody>
       </p:sp>
@@ -688,11 +1048,10 @@
           <a:bodyPr/>
           <a:lstStyle/>
           <a:p>
-            <a:fld id="{91E254DF-DAF9-438F-92A9-B044143B9B02}" type="datetimeFigureOut">
-              <a:rPr lang="en-CA" smtClean="0"/>
-              <a:t>2024-02-01</a:t>
-            </a:fld>
-            <a:endParaRPr lang="en-CA"/>
+            <a:r>
+              <a:rPr lang="en-CA"/>
+              <a:t>March 2024</a:t>
+            </a:r>
           </a:p>
         </p:txBody>
       </p:sp>
@@ -711,7 +1070,10 @@
           <a:bodyPr/>
           <a:lstStyle/>
           <a:p>
-            <a:endParaRPr lang="en-CA"/>
+            <a:r>
+              <a:rPr lang="en-CA"/>
+              <a:t>Production - Model Deployment</a:t>
+            </a:r>
           </a:p>
         </p:txBody>
       </p:sp>
@@ -858,11 +1220,10 @@
           <a:bodyPr/>
           <a:lstStyle/>
           <a:p>
-            <a:fld id="{91E254DF-DAF9-438F-92A9-B044143B9B02}" type="datetimeFigureOut">
-              <a:rPr lang="en-CA" smtClean="0"/>
-              <a:t>2024-02-01</a:t>
-            </a:fld>
-            <a:endParaRPr lang="en-CA"/>
+            <a:r>
+              <a:rPr lang="en-CA"/>
+              <a:t>March 2024</a:t>
+            </a:r>
           </a:p>
         </p:txBody>
       </p:sp>
@@ -881,7 +1242,10 @@
           <a:bodyPr/>
           <a:lstStyle/>
           <a:p>
-            <a:endParaRPr lang="en-CA"/>
+            <a:r>
+              <a:rPr lang="en-CA"/>
+              <a:t>Production - Model Deployment</a:t>
+            </a:r>
           </a:p>
         </p:txBody>
       </p:sp>
@@ -1114,11 +1478,10 @@
           <a:bodyPr/>
           <a:lstStyle/>
           <a:p>
-            <a:fld id="{91E254DF-DAF9-438F-92A9-B044143B9B02}" type="datetimeFigureOut">
-              <a:rPr lang="en-CA" smtClean="0"/>
-              <a:t>2024-02-01</a:t>
-            </a:fld>
-            <a:endParaRPr lang="en-CA"/>
+            <a:r>
+              <a:rPr lang="en-CA"/>
+              <a:t>March 2024</a:t>
+            </a:r>
           </a:p>
         </p:txBody>
       </p:sp>
@@ -1137,7 +1500,10 @@
           <a:bodyPr/>
           <a:lstStyle/>
           <a:p>
-            <a:endParaRPr lang="en-CA"/>
+            <a:r>
+              <a:rPr lang="en-CA"/>
+              <a:t>Production - Model Deployment</a:t>
+            </a:r>
           </a:p>
         </p:txBody>
       </p:sp>
@@ -1402,11 +1768,10 @@
           <a:bodyPr/>
           <a:lstStyle/>
           <a:p>
-            <a:fld id="{91E254DF-DAF9-438F-92A9-B044143B9B02}" type="datetimeFigureOut">
-              <a:rPr lang="en-CA" smtClean="0"/>
-              <a:t>2024-02-01</a:t>
-            </a:fld>
-            <a:endParaRPr lang="en-CA"/>
+            <a:r>
+              <a:rPr lang="en-CA"/>
+              <a:t>March 2024</a:t>
+            </a:r>
           </a:p>
         </p:txBody>
       </p:sp>
@@ -1425,7 +1790,10 @@
           <a:bodyPr/>
           <a:lstStyle/>
           <a:p>
-            <a:endParaRPr lang="en-CA"/>
+            <a:r>
+              <a:rPr lang="en-CA"/>
+              <a:t>Production - Model Deployment</a:t>
+            </a:r>
           </a:p>
         </p:txBody>
       </p:sp>
@@ -1840,11 +2208,10 @@
           <a:bodyPr/>
           <a:lstStyle/>
           <a:p>
-            <a:fld id="{91E254DF-DAF9-438F-92A9-B044143B9B02}" type="datetimeFigureOut">
-              <a:rPr lang="en-CA" smtClean="0"/>
-              <a:t>2024-02-01</a:t>
-            </a:fld>
-            <a:endParaRPr lang="en-CA"/>
+            <a:r>
+              <a:rPr lang="en-CA"/>
+              <a:t>March 2024</a:t>
+            </a:r>
           </a:p>
         </p:txBody>
       </p:sp>
@@ -1863,7 +2230,10 @@
           <a:bodyPr/>
           <a:lstStyle/>
           <a:p>
-            <a:endParaRPr lang="en-CA"/>
+            <a:r>
+              <a:rPr lang="en-CA"/>
+              <a:t>Production - Model Deployment</a:t>
+            </a:r>
           </a:p>
         </p:txBody>
       </p:sp>
@@ -1958,11 +2328,10 @@
           <a:bodyPr/>
           <a:lstStyle/>
           <a:p>
-            <a:fld id="{91E254DF-DAF9-438F-92A9-B044143B9B02}" type="datetimeFigureOut">
-              <a:rPr lang="en-CA" smtClean="0"/>
-              <a:t>2024-02-01</a:t>
-            </a:fld>
-            <a:endParaRPr lang="en-CA"/>
+            <a:r>
+              <a:rPr lang="en-CA"/>
+              <a:t>March 2024</a:t>
+            </a:r>
           </a:p>
         </p:txBody>
       </p:sp>
@@ -1981,7 +2350,10 @@
           <a:bodyPr/>
           <a:lstStyle/>
           <a:p>
-            <a:endParaRPr lang="en-CA"/>
+            <a:r>
+              <a:rPr lang="en-CA"/>
+              <a:t>Production - Model Deployment</a:t>
+            </a:r>
           </a:p>
         </p:txBody>
       </p:sp>
@@ -2053,11 +2425,10 @@
           <a:bodyPr/>
           <a:lstStyle/>
           <a:p>
-            <a:fld id="{91E254DF-DAF9-438F-92A9-B044143B9B02}" type="datetimeFigureOut">
-              <a:rPr lang="en-CA" smtClean="0"/>
-              <a:t>2024-02-01</a:t>
-            </a:fld>
-            <a:endParaRPr lang="en-CA"/>
+            <a:r>
+              <a:rPr lang="en-CA"/>
+              <a:t>March 2024</a:t>
+            </a:r>
           </a:p>
         </p:txBody>
       </p:sp>
@@ -2076,7 +2447,10 @@
           <a:bodyPr/>
           <a:lstStyle/>
           <a:p>
-            <a:endParaRPr lang="en-CA"/>
+            <a:r>
+              <a:rPr lang="en-CA"/>
+              <a:t>Production - Model Deployment</a:t>
+            </a:r>
           </a:p>
         </p:txBody>
       </p:sp>
@@ -2409,11 +2783,10 @@
           <a:bodyPr/>
           <a:lstStyle/>
           <a:p>
-            <a:fld id="{91E254DF-DAF9-438F-92A9-B044143B9B02}" type="datetimeFigureOut">
-              <a:rPr lang="en-CA" smtClean="0"/>
-              <a:t>2024-02-01</a:t>
-            </a:fld>
-            <a:endParaRPr lang="en-CA"/>
+            <a:r>
+              <a:rPr lang="en-CA"/>
+              <a:t>March 2024</a:t>
+            </a:r>
           </a:p>
         </p:txBody>
       </p:sp>
@@ -2432,7 +2805,10 @@
           <a:bodyPr/>
           <a:lstStyle/>
           <a:p>
-            <a:endParaRPr lang="en-CA"/>
+            <a:r>
+              <a:rPr lang="en-CA"/>
+              <a:t>Production - Model Deployment</a:t>
+            </a:r>
           </a:p>
         </p:txBody>
       </p:sp>
@@ -2725,11 +3101,10 @@
             </a:lvl1pPr>
           </a:lstStyle>
           <a:p>
-            <a:fld id="{91E254DF-DAF9-438F-92A9-B044143B9B02}" type="datetimeFigureOut">
-              <a:rPr lang="en-CA" smtClean="0"/>
-              <a:t>2024-02-01</a:t>
-            </a:fld>
-            <a:endParaRPr lang="en-CA"/>
+            <a:r>
+              <a:rPr lang="en-CA"/>
+              <a:t>March 2024</a:t>
+            </a:r>
           </a:p>
         </p:txBody>
       </p:sp>
@@ -2758,7 +3133,10 @@
             </a:lvl1pPr>
           </a:lstStyle>
           <a:p>
-            <a:endParaRPr lang="en-CA"/>
+            <a:r>
+              <a:rPr lang="en-CA"/>
+              <a:t>Production - Model Deployment</a:t>
+            </a:r>
           </a:p>
         </p:txBody>
       </p:sp>
@@ -2809,7 +3187,7 @@
 </file>
 
 <file path=ppt/slideMasters/slideMaster1.xml><?xml version="1.0" encoding="utf-8"?>
-<p:sldMaster xmlns:a="http://schemas.openxmlformats.org/drawingml/2006/main" xmlns:p="http://schemas.openxmlformats.org/presentationml/2006/main" xmlns:r="http://schemas.openxmlformats.org/officeDocument/2006/relationships">
+<p:sldMaster xmlns:a="http://schemas.openxmlformats.org/drawingml/2006/main" xmlns:r="http://schemas.openxmlformats.org/officeDocument/2006/relationships" xmlns:p="http://schemas.openxmlformats.org/presentationml/2006/main">
   <p:cSld>
     <p:bg>
       <p:bgRef idx="1001">
@@ -2850,13 +3228,13 @@
           </a:prstGeom>
         </p:spPr>
         <p:txBody>
-          <a:bodyPr anchor="ctr" bIns="45720" lIns="91440" rIns="91440" rtlCol="0" tIns="45720" vert="horz">
+          <a:bodyPr vert="horz" lIns="91440" tIns="45720" rIns="91440" bIns="45720" rtlCol="0" anchor="ctr">
             <a:normAutofit/>
           </a:bodyPr>
           <a:lstStyle/>
           <a:p>
             <a:r>
-              <a:rPr dirty="0" lang="en-US"/>
+              <a:rPr lang="en-US" dirty="0"/>
               <a:t>Click to edit Master title style</a:t>
             </a:r>
           </a:p>
@@ -2869,7 +3247,7 @@
             <a:spLocks noGrp="1"/>
           </p:cNvSpPr>
           <p:nvPr>
-            <p:ph idx="1" type="body"/>
+            <p:ph type="body" idx="1"/>
           </p:nvPr>
         </p:nvSpPr>
         <p:spPr>
@@ -2882,42 +3260,42 @@
           </a:prstGeom>
         </p:spPr>
         <p:txBody>
-          <a:bodyPr bIns="45720" lIns="91440" rIns="91440" rtlCol="0" tIns="45720" vert="horz">
+          <a:bodyPr vert="horz" lIns="91440" tIns="45720" rIns="91440" bIns="45720" rtlCol="0">
             <a:normAutofit/>
           </a:bodyPr>
           <a:lstStyle/>
           <a:p>
             <a:pPr lvl="0"/>
             <a:r>
-              <a:rPr dirty="0" lang="en-US"/>
+              <a:rPr lang="en-US" dirty="0"/>
               <a:t>Click to edit Master text styles</a:t>
             </a:r>
           </a:p>
           <a:p>
             <a:pPr lvl="1"/>
             <a:r>
-              <a:rPr dirty="0" lang="en-US"/>
+              <a:rPr lang="en-US" dirty="0"/>
               <a:t>Second level</a:t>
             </a:r>
           </a:p>
           <a:p>
             <a:pPr lvl="2"/>
             <a:r>
-              <a:rPr dirty="0" lang="en-US"/>
+              <a:rPr lang="en-US" dirty="0"/>
               <a:t>Third level</a:t>
             </a:r>
           </a:p>
           <a:p>
             <a:pPr lvl="3"/>
             <a:r>
-              <a:rPr dirty="0" lang="en-US"/>
+              <a:rPr lang="en-US" dirty="0"/>
               <a:t>Fourth level</a:t>
             </a:r>
           </a:p>
           <a:p>
             <a:pPr lvl="4"/>
             <a:r>
-              <a:rPr dirty="0" lang="en-US"/>
+              <a:rPr lang="en-US" dirty="0"/>
               <a:t>Fifth level</a:t>
             </a:r>
           </a:p>
@@ -2930,7 +3308,7 @@
             <a:spLocks noGrp="1"/>
           </p:cNvSpPr>
           <p:nvPr>
-            <p:ph idx="2" sz="half" type="dt"/>
+            <p:ph type="dt" sz="half" idx="2"/>
           </p:nvPr>
         </p:nvSpPr>
         <p:spPr>
@@ -2943,7 +3321,7 @@
           </a:prstGeom>
         </p:spPr>
         <p:txBody>
-          <a:bodyPr anchor="ctr" bIns="45720" lIns="91440" rIns="91440" rtlCol="0" tIns="45720" vert="horz"/>
+          <a:bodyPr vert="horz" lIns="91440" tIns="45720" rIns="91440" bIns="45720" rtlCol="0" anchor="ctr"/>
           <a:lstStyle>
             <a:lvl1pPr algn="l">
               <a:defRPr sz="950">
@@ -2956,11 +3334,10 @@
             </a:lvl1pPr>
           </a:lstStyle>
           <a:p>
-            <a:fld id="{91E254DF-DAF9-438F-92A9-B044143B9B02}" type="datetimeFigureOut">
-              <a:rPr lang="en-CA" smtClean="0"/>
-              <a:t>2024-02-01</a:t>
-            </a:fld>
-            <a:endParaRPr lang="en-CA"/>
+            <a:r>
+              <a:rPr lang="en-CA"/>
+              <a:t>March 2024</a:t>
+            </a:r>
           </a:p>
         </p:txBody>
       </p:sp>
@@ -2971,7 +3348,7 @@
             <a:spLocks noGrp="1"/>
           </p:cNvSpPr>
           <p:nvPr>
-            <p:ph idx="3" sz="quarter" type="ftr"/>
+            <p:ph type="ftr" sz="quarter" idx="3"/>
           </p:nvPr>
         </p:nvSpPr>
         <p:spPr>
@@ -2984,10 +3361,10 @@
           </a:prstGeom>
         </p:spPr>
         <p:txBody>
-          <a:bodyPr anchor="ctr" bIns="45720" lIns="91440" rIns="91440" rtlCol="0" tIns="45720" vert="horz"/>
+          <a:bodyPr vert="horz" lIns="91440" tIns="45720" rIns="91440" bIns="45720" rtlCol="0" anchor="ctr"/>
           <a:lstStyle>
             <a:lvl1pPr algn="l">
-              <a:defRPr baseline="0" cap="all" sz="950">
+              <a:defRPr sz="950" cap="all" baseline="0">
                 <a:solidFill>
                   <a:schemeClr val="tx1">
                     <a:alpha val="80000"/>
@@ -2997,7 +3374,10 @@
             </a:lvl1pPr>
           </a:lstStyle>
           <a:p>
-            <a:endParaRPr lang="en-CA"/>
+            <a:r>
+              <a:rPr lang="en-CA"/>
+              <a:t>Production - Model Deployment</a:t>
+            </a:r>
           </a:p>
         </p:txBody>
       </p:sp>
@@ -3008,7 +3388,7 @@
             <a:spLocks noGrp="1"/>
           </p:cNvSpPr>
           <p:nvPr>
-            <p:ph idx="4" sz="quarter" type="sldNum"/>
+            <p:ph type="sldNum" sz="quarter" idx="4"/>
           </p:nvPr>
         </p:nvSpPr>
         <p:spPr>
@@ -3021,10 +3401,10 @@
           </a:prstGeom>
         </p:spPr>
         <p:txBody>
-          <a:bodyPr anchor="b" bIns="45720" lIns="91440" rIns="91440" rtlCol="0" tIns="45720" vert="horz"/>
+          <a:bodyPr vert="horz" lIns="91440" tIns="45720" rIns="91440" bIns="45720" rtlCol="0" anchor="b"/>
           <a:lstStyle>
             <a:lvl1pPr algn="r">
-              <a:defRPr b="0" sz="10300">
+              <a:defRPr sz="10300" b="0">
                 <a:ln>
                   <a:noFill/>
                 </a:ln>
@@ -3053,7 +3433,7 @@
       </p:ext>
     </p:extLst>
   </p:cSld>
-  <p:clrMap accent1="accent1" accent2="accent2" accent3="accent3" accent4="accent4" accent5="accent5" accent6="accent6" bg1="lt1" bg2="lt2" folHlink="folHlink" hlink="hlink" tx1="dk1" tx2="dk2"/>
+  <p:clrMap bg1="lt1" tx1="dk1" bg2="lt2" tx2="dk2" accent1="accent1" accent2="accent2" accent3="accent3" accent4="accent4" accent5="accent5" accent6="accent6" hlink="hlink" folHlink="folHlink"/>
   <p:sldLayoutIdLst>
     <p:sldLayoutId id="2147484297" r:id="rId1"/>
     <p:sldLayoutId id="2147484298" r:id="rId2"/>
@@ -3067,9 +3447,10 @@
     <p:sldLayoutId id="2147484306" r:id="rId10"/>
     <p:sldLayoutId id="2147484307" r:id="rId11"/>
   </p:sldLayoutIdLst>
+  <p:hf hdr="0"/>
   <p:txStyles>
     <p:titleStyle>
-      <a:lvl1pPr algn="l" defTabSz="914400" eaLnBrk="1" hangingPunct="1" latinLnBrk="0" rtl="0">
+      <a:lvl1pPr algn="l" defTabSz="914400" rtl="0" eaLnBrk="1" latinLnBrk="0" hangingPunct="1">
         <a:lnSpc>
           <a:spcPct val="85000"/>
         </a:lnSpc>
@@ -3077,7 +3458,7 @@
           <a:spcPct val="0"/>
         </a:spcBef>
         <a:buNone/>
-        <a:defRPr baseline="0" kern="1200" spc="-120" sz="4000">
+        <a:defRPr sz="4000" kern="1200" spc="-120" baseline="0">
           <a:solidFill>
             <a:schemeClr val="accent1"/>
           </a:solidFill>
@@ -3088,16 +3469,16 @@
       </a:lvl1pPr>
     </p:titleStyle>
     <p:bodyStyle>
-      <a:lvl1pPr algn="l" defTabSz="914400" eaLnBrk="1" hangingPunct="1" indent="-230188" latinLnBrk="0" marL="230188" rtl="0">
+      <a:lvl1pPr marL="230188" indent="-230188" algn="l" defTabSz="914400" rtl="0" eaLnBrk="1" latinLnBrk="0" hangingPunct="1">
         <a:lnSpc>
           <a:spcPct val="114000"/>
         </a:lnSpc>
         <a:spcBef>
           <a:spcPts val="1300"/>
         </a:spcBef>
-        <a:buFont charset="0" panose="020B0604020202020204" pitchFamily="34" typeface="Arial"/>
+        <a:buFont typeface="Arial" panose="020B0604020202020204" pitchFamily="34" charset="0"/>
         <a:buChar char="•"/>
-        <a:defRPr kern="1200" sz="1400">
+        <a:defRPr sz="1400" kern="1200">
           <a:solidFill>
             <a:schemeClr val="tx1">
               <a:lumMod val="85000"/>
@@ -3109,16 +3490,16 @@
           <a:cs typeface="+mn-cs"/>
         </a:defRPr>
       </a:lvl1pPr>
-      <a:lvl2pPr algn="l" defTabSz="914400" eaLnBrk="1" hangingPunct="1" indent="-230188" latinLnBrk="0" marL="346075" rtl="0">
+      <a:lvl2pPr marL="346075" indent="-230188" algn="l" defTabSz="914400" rtl="0" eaLnBrk="1" latinLnBrk="0" hangingPunct="1">
         <a:lnSpc>
           <a:spcPct val="114000"/>
         </a:lnSpc>
         <a:spcBef>
           <a:spcPts val="600"/>
         </a:spcBef>
-        <a:buFont charset="0" panose="02070309020205020404" pitchFamily="49" typeface="Courier New"/>
+        <a:buFont typeface="Courier New" panose="02070309020205020404" pitchFamily="49" charset="0"/>
         <a:buChar char="o"/>
-        <a:defRPr kern="1200" sz="1200">
+        <a:defRPr sz="1200" kern="1200">
           <a:solidFill>
             <a:schemeClr val="tx1">
               <a:lumMod val="85000"/>
@@ -3130,16 +3511,16 @@
           <a:cs typeface="+mn-cs"/>
         </a:defRPr>
       </a:lvl2pPr>
-      <a:lvl3pPr algn="l" defTabSz="914400" eaLnBrk="1" hangingPunct="1" indent="-201613" latinLnBrk="0" marL="547688" rtl="0">
+      <a:lvl3pPr marL="547688" indent="-201613" algn="l" defTabSz="914400" rtl="0" eaLnBrk="1" latinLnBrk="0" hangingPunct="1">
         <a:lnSpc>
           <a:spcPct val="114000"/>
         </a:lnSpc>
         <a:spcBef>
           <a:spcPts val="600"/>
         </a:spcBef>
-        <a:buFont charset="2" panose="05000000000000000000" pitchFamily="2" typeface="Wingdings"/>
+        <a:buFont typeface="Wingdings" panose="05000000000000000000" pitchFamily="2" charset="2"/>
         <a:buChar char="§"/>
-        <a:defRPr i="1" kern="1200" sz="1100">
+        <a:defRPr sz="1100" i="1" kern="1200">
           <a:solidFill>
             <a:schemeClr val="tx1">
               <a:lumMod val="85000"/>
@@ -3151,16 +3532,16 @@
           <a:cs typeface="+mn-cs"/>
         </a:defRPr>
       </a:lvl3pPr>
-      <a:lvl4pPr algn="l" defTabSz="914400" eaLnBrk="1" hangingPunct="1" indent="-138113" latinLnBrk="0" marL="822325" rtl="0">
+      <a:lvl4pPr marL="822325" indent="-138113" algn="l" defTabSz="914400" rtl="0" eaLnBrk="1" latinLnBrk="0" hangingPunct="1">
         <a:lnSpc>
           <a:spcPct val="114000"/>
         </a:lnSpc>
         <a:spcBef>
           <a:spcPts val="600"/>
         </a:spcBef>
-        <a:buFont charset="2" panose="05000000000000000000" pitchFamily="2" typeface="Wingdings"/>
+        <a:buFont typeface="Wingdings" panose="05000000000000000000" pitchFamily="2" charset="2"/>
         <a:buChar char="q"/>
-        <a:defRPr kern="1200" sz="1050">
+        <a:defRPr sz="1050" kern="1200">
           <a:solidFill>
             <a:schemeClr val="tx1">
               <a:lumMod val="85000"/>
@@ -3172,16 +3553,16 @@
           <a:cs typeface="+mn-cs"/>
         </a:defRPr>
       </a:lvl4pPr>
-      <a:lvl5pPr algn="l" defTabSz="914400" eaLnBrk="1" hangingPunct="1" indent="-182563" latinLnBrk="0" marL="1096963" rtl="0">
+      <a:lvl5pPr marL="1096963" indent="-182563" algn="l" defTabSz="914400" rtl="0" eaLnBrk="1" latinLnBrk="0" hangingPunct="1">
         <a:lnSpc>
           <a:spcPct val="114000"/>
         </a:lnSpc>
         <a:spcBef>
           <a:spcPts val="600"/>
         </a:spcBef>
-        <a:buFont charset="2" panose="05000000000000000000" pitchFamily="2" typeface="Wingdings"/>
+        <a:buFont typeface="Wingdings" panose="05000000000000000000" pitchFamily="2" charset="2"/>
         <a:buChar char="v"/>
-        <a:defRPr kern="1200" sz="1000">
+        <a:defRPr sz="1000" kern="1200">
           <a:solidFill>
             <a:schemeClr val="tx1">
               <a:lumMod val="85000"/>
@@ -3193,16 +3574,16 @@
           <a:cs typeface="+mn-cs"/>
         </a:defRPr>
       </a:lvl5pPr>
-      <a:lvl6pPr algn="l" defTabSz="914400" eaLnBrk="1" hangingPunct="1" indent="-228600" latinLnBrk="0" marL="1200000" rtl="0">
+      <a:lvl6pPr marL="1200000" indent="-228600" algn="l" defTabSz="914400" rtl="0" eaLnBrk="1" latinLnBrk="0" hangingPunct="1">
         <a:lnSpc>
           <a:spcPct val="85000"/>
         </a:lnSpc>
         <a:spcBef>
           <a:spcPts val="600"/>
         </a:spcBef>
-        <a:buFont charset="0" pitchFamily="34" typeface="Arial"/>
+        <a:buFont typeface="Arial" pitchFamily="34" charset="0"/>
         <a:buChar char=" "/>
-        <a:defRPr kern="1200" sz="1800">
+        <a:defRPr sz="1800" kern="1200">
           <a:solidFill>
             <a:schemeClr val="tx1">
               <a:lumMod val="85000"/>
@@ -3214,16 +3595,16 @@
           <a:cs typeface="+mn-cs"/>
         </a:defRPr>
       </a:lvl6pPr>
-      <a:lvl7pPr algn="l" defTabSz="914400" eaLnBrk="1" hangingPunct="1" indent="-228600" latinLnBrk="0" marL="1400000" rtl="0">
+      <a:lvl7pPr marL="1400000" indent="-228600" algn="l" defTabSz="914400" rtl="0" eaLnBrk="1" latinLnBrk="0" hangingPunct="1">
         <a:lnSpc>
           <a:spcPct val="85000"/>
         </a:lnSpc>
         <a:spcBef>
           <a:spcPts val="600"/>
         </a:spcBef>
-        <a:buFont charset="0" pitchFamily="34" typeface="Arial"/>
+        <a:buFont typeface="Arial" pitchFamily="34" charset="0"/>
         <a:buChar char=" "/>
-        <a:defRPr kern="1200" sz="1800">
+        <a:defRPr sz="1800" kern="1200">
           <a:solidFill>
             <a:schemeClr val="tx1">
               <a:lumMod val="85000"/>
@@ -3235,16 +3616,16 @@
           <a:cs typeface="+mn-cs"/>
         </a:defRPr>
       </a:lvl7pPr>
-      <a:lvl8pPr algn="l" defTabSz="914400" eaLnBrk="1" hangingPunct="1" indent="-228600" latinLnBrk="0" marL="1600000" rtl="0">
+      <a:lvl8pPr marL="1600000" indent="-228600" algn="l" defTabSz="914400" rtl="0" eaLnBrk="1" latinLnBrk="0" hangingPunct="1">
         <a:lnSpc>
           <a:spcPct val="85000"/>
         </a:lnSpc>
         <a:spcBef>
           <a:spcPts val="600"/>
         </a:spcBef>
-        <a:buFont charset="0" pitchFamily="34" typeface="Arial"/>
+        <a:buFont typeface="Arial" pitchFamily="34" charset="0"/>
         <a:buChar char=" "/>
-        <a:defRPr kern="1200" sz="1800">
+        <a:defRPr sz="1800" kern="1200">
           <a:solidFill>
             <a:schemeClr val="tx1">
               <a:lumMod val="85000"/>
@@ -3256,16 +3637,16 @@
           <a:cs typeface="+mn-cs"/>
         </a:defRPr>
       </a:lvl8pPr>
-      <a:lvl9pPr algn="l" defTabSz="914400" eaLnBrk="1" hangingPunct="1" indent="-228600" latinLnBrk="0" marL="1800000" rtl="0">
+      <a:lvl9pPr marL="1800000" indent="-228600" algn="l" defTabSz="914400" rtl="0" eaLnBrk="1" latinLnBrk="0" hangingPunct="1">
         <a:lnSpc>
           <a:spcPct val="85000"/>
         </a:lnSpc>
         <a:spcBef>
           <a:spcPts val="600"/>
         </a:spcBef>
-        <a:buFont charset="0" pitchFamily="34" typeface="Arial"/>
+        <a:buFont typeface="Arial" pitchFamily="34" charset="0"/>
         <a:buChar char=" "/>
-        <a:defRPr kern="1200" sz="1800">
+        <a:defRPr sz="1800" kern="1200">
           <a:solidFill>
             <a:schemeClr val="tx1">
               <a:lumMod val="85000"/>
@@ -3282,8 +3663,8 @@
       <a:defPPr>
         <a:defRPr lang="en-US"/>
       </a:defPPr>
-      <a:lvl1pPr algn="l" defTabSz="914400" eaLnBrk="1" hangingPunct="1" latinLnBrk="0" marL="0" rtl="0">
-        <a:defRPr kern="1200" sz="1800">
+      <a:lvl1pPr marL="0" algn="l" defTabSz="914400" rtl="0" eaLnBrk="1" latinLnBrk="0" hangingPunct="1">
+        <a:defRPr sz="1800" kern="1200">
           <a:solidFill>
             <a:schemeClr val="tx1"/>
           </a:solidFill>
@@ -3292,8 +3673,8 @@
           <a:cs typeface="+mn-cs"/>
         </a:defRPr>
       </a:lvl1pPr>
-      <a:lvl2pPr algn="l" defTabSz="914400" eaLnBrk="1" hangingPunct="1" latinLnBrk="0" marL="457200" rtl="0">
-        <a:defRPr kern="1200" sz="1800">
+      <a:lvl2pPr marL="457200" algn="l" defTabSz="914400" rtl="0" eaLnBrk="1" latinLnBrk="0" hangingPunct="1">
+        <a:defRPr sz="1800" kern="1200">
           <a:solidFill>
             <a:schemeClr val="tx1"/>
           </a:solidFill>
@@ -3302,8 +3683,8 @@
           <a:cs typeface="+mn-cs"/>
         </a:defRPr>
       </a:lvl2pPr>
-      <a:lvl3pPr algn="l" defTabSz="914400" eaLnBrk="1" hangingPunct="1" latinLnBrk="0" marL="914400" rtl="0">
-        <a:defRPr kern="1200" sz="1800">
+      <a:lvl3pPr marL="914400" algn="l" defTabSz="914400" rtl="0" eaLnBrk="1" latinLnBrk="0" hangingPunct="1">
+        <a:defRPr sz="1800" kern="1200">
           <a:solidFill>
             <a:schemeClr val="tx1"/>
           </a:solidFill>
@@ -3312,8 +3693,8 @@
           <a:cs typeface="+mn-cs"/>
         </a:defRPr>
       </a:lvl3pPr>
-      <a:lvl4pPr algn="l" defTabSz="914400" eaLnBrk="1" hangingPunct="1" latinLnBrk="0" marL="1371600" rtl="0">
-        <a:defRPr kern="1200" sz="1800">
+      <a:lvl4pPr marL="1371600" algn="l" defTabSz="914400" rtl="0" eaLnBrk="1" latinLnBrk="0" hangingPunct="1">
+        <a:defRPr sz="1800" kern="1200">
           <a:solidFill>
             <a:schemeClr val="tx1"/>
           </a:solidFill>
@@ -3322,8 +3703,8 @@
           <a:cs typeface="+mn-cs"/>
         </a:defRPr>
       </a:lvl4pPr>
-      <a:lvl5pPr algn="l" defTabSz="914400" eaLnBrk="1" hangingPunct="1" latinLnBrk="0" marL="1828800" rtl="0">
-        <a:defRPr kern="1200" sz="1800">
+      <a:lvl5pPr marL="1828800" algn="l" defTabSz="914400" rtl="0" eaLnBrk="1" latinLnBrk="0" hangingPunct="1">
+        <a:defRPr sz="1800" kern="1200">
           <a:solidFill>
             <a:schemeClr val="tx1"/>
           </a:solidFill>
@@ -3332,8 +3713,8 @@
           <a:cs typeface="+mn-cs"/>
         </a:defRPr>
       </a:lvl5pPr>
-      <a:lvl6pPr algn="l" defTabSz="914400" eaLnBrk="1" hangingPunct="1" latinLnBrk="0" marL="2286000" rtl="0">
-        <a:defRPr kern="1200" sz="1800">
+      <a:lvl6pPr marL="2286000" algn="l" defTabSz="914400" rtl="0" eaLnBrk="1" latinLnBrk="0" hangingPunct="1">
+        <a:defRPr sz="1800" kern="1200">
           <a:solidFill>
             <a:schemeClr val="tx1"/>
           </a:solidFill>
@@ -3342,8 +3723,8 @@
           <a:cs typeface="+mn-cs"/>
         </a:defRPr>
       </a:lvl6pPr>
-      <a:lvl7pPr algn="l" defTabSz="914400" eaLnBrk="1" hangingPunct="1" latinLnBrk="0" marL="2743200" rtl="0">
-        <a:defRPr kern="1200" sz="1800">
+      <a:lvl7pPr marL="2743200" algn="l" defTabSz="914400" rtl="0" eaLnBrk="1" latinLnBrk="0" hangingPunct="1">
+        <a:defRPr sz="1800" kern="1200">
           <a:solidFill>
             <a:schemeClr val="tx1"/>
           </a:solidFill>
@@ -3352,8 +3733,8 @@
           <a:cs typeface="+mn-cs"/>
         </a:defRPr>
       </a:lvl7pPr>
-      <a:lvl8pPr algn="l" defTabSz="914400" eaLnBrk="1" hangingPunct="1" latinLnBrk="0" marL="3200400" rtl="0">
-        <a:defRPr kern="1200" sz="1800">
+      <a:lvl8pPr marL="3200400" algn="l" defTabSz="914400" rtl="0" eaLnBrk="1" latinLnBrk="0" hangingPunct="1">
+        <a:defRPr sz="1800" kern="1200">
           <a:solidFill>
             <a:schemeClr val="tx1"/>
           </a:solidFill>
@@ -3362,8 +3743,8 @@
           <a:cs typeface="+mn-cs"/>
         </a:defRPr>
       </a:lvl8pPr>
-      <a:lvl9pPr algn="l" defTabSz="914400" eaLnBrk="1" hangingPunct="1" latinLnBrk="0" marL="3657600" rtl="0">
-        <a:defRPr kern="1200" sz="1800">
+      <a:lvl9pPr marL="3657600" algn="l" defTabSz="914400" rtl="0" eaLnBrk="1" latinLnBrk="0" hangingPunct="1">
+        <a:defRPr sz="1800" kern="1200">
           <a:solidFill>
             <a:schemeClr val="tx1"/>
           </a:solidFill>
@@ -3414,11 +3795,10 @@
           <a:bodyPr/>
           <a:lstStyle/>
           <a:p>
-            <a:pPr lvl="0" indent="0" marL="0">
+            <a:pPr marL="0" lvl="0" indent="0">
               <a:buNone/>
             </a:pPr>
             <a:r>
-              <a:rPr/>
               <a:t>Model Deployment</a:t>
             </a:r>
           </a:p>
@@ -3431,7 +3811,7 @@
             <a:spLocks noGrp="1"/>
           </p:cNvSpPr>
           <p:nvPr>
-            <p:ph idx="1" type="subTitle"/>
+            <p:ph type="subTitle" idx="1"/>
           </p:nvPr>
         </p:nvSpPr>
         <p:spPr>
@@ -3444,17 +3824,15 @@
           <a:bodyPr/>
           <a:lstStyle/>
           <a:p>
-            <a:pPr lvl="0" indent="0" marL="0">
+            <a:pPr marL="0" lvl="0" indent="0">
               <a:buNone/>
             </a:pPr>
             <a:r>
-              <a:rPr/>
               <a:t>Production</a:t>
             </a:r>
             <a:br/>
             <a:br/>
             <a:r>
-              <a:rPr/>
               <a:t>Jesús Calderón</a:t>
             </a:r>
           </a:p>
@@ -3462,6 +3840,9 @@
       </p:sp>
     </p:spTree>
   </p:cSld>
+  <p:clrMapOvr>
+    <a:masterClrMapping/>
+  </p:clrMapOvr>
 </p:sld>
 </file>
 
@@ -3497,12 +3878,11 @@
           <a:bodyPr/>
           <a:lstStyle/>
           <a:p>
-            <a:pPr lvl="0" indent="0" marL="0">
+            <a:pPr marL="0" lvl="0" indent="0">
               <a:buNone/>
             </a:pPr>
             <a:r>
-              <a:rPr/>
-              <a:t>Model Prediction (Inference) Service</a:t>
+              <a:t>Deployment Myths and Anti-Patterns (cont.)</a:t>
             </a:r>
           </a:p>
         </p:txBody>
@@ -3514,98 +3894,185 @@
             <a:spLocks noGrp="1"/>
           </p:cNvSpPr>
           <p:nvPr>
-            <p:ph idx="1" sz="half"/>
-          </p:nvPr>
-        </p:nvSpPr>
-        <p:spPr/>
-        <p:txBody>
-          <a:bodyPr/>
-          <a:lstStyle/>
+            <p:ph sz="half" idx="1"/>
+          </p:nvPr>
+        </p:nvSpPr>
+        <p:spPr/>
+        <p:txBody>
+          <a:bodyPr>
+            <a:normAutofit fontScale="85000" lnSpcReduction="10000"/>
+          </a:bodyPr>
+          <a:lstStyle/>
+          <a:p>
+            <a:pPr marL="0" lvl="0" indent="0">
+              <a:buNone/>
+            </a:pPr>
+            <a:r>
+              <a:rPr b="1"/>
+              <a:t>3. You won’t need to update your models as much</a:t>
+            </a:r>
+          </a:p>
           <a:p>
             <a:pPr lvl="0"/>
             <a:r>
-              <a:rPr/>
-              <a:t>Batch prediction: uses only batch features.</a:t>
+              <a:t>Model performance decays over time.</a:t>
             </a:r>
           </a:p>
           <a:p>
             <a:pPr lvl="0"/>
             <a:r>
-              <a:rPr/>
-              <a:t>Online prediction that uses only batch features (e.g., precomputed embeddings).</a:t>
+              <a:t>Deploy should be easy:</a:t>
+            </a:r>
+          </a:p>
+          <a:p>
+            <a:pPr lvl="1"/>
+            <a:r>
+              <a:t>The development environment should resemble the production environment as closely as possible.</a:t>
+            </a:r>
+          </a:p>
+          <a:p>
+            <a:pPr lvl="1"/>
+            <a:r>
+              <a:t>Infrastructure should be easier to rebuild than to repair.</a:t>
+            </a:r>
+          </a:p>
+          <a:p>
+            <a:pPr lvl="1"/>
+            <a:r>
+              <a:t>Small incremental and frequent changes.</a:t>
+            </a:r>
+          </a:p>
+        </p:txBody>
+      </p:sp>
+      <p:sp>
+        <p:nvSpPr>
+          <p:cNvPr id="4" name="Content Placeholder 3"/>
+          <p:cNvSpPr>
+            <a:spLocks noGrp="1"/>
+          </p:cNvSpPr>
+          <p:nvPr>
+            <p:ph sz="half" idx="2"/>
+          </p:nvPr>
+        </p:nvSpPr>
+        <p:spPr/>
+        <p:txBody>
+          <a:bodyPr>
+            <a:normAutofit fontScale="85000" lnSpcReduction="10000"/>
+          </a:bodyPr>
+          <a:lstStyle/>
+          <a:p>
+            <a:pPr marL="0" lvl="0" indent="0">
+              <a:buNone/>
+            </a:pPr>
+            <a:r>
+              <a:rPr b="1"/>
+              <a:t>4. Most ML engineers don’t need to worry about scale</a:t>
             </a:r>
           </a:p>
           <a:p>
             <a:pPr lvl="0"/>
             <a:r>
-              <a:rPr/>
-              <a:t>Online streaming prediction: uses batch features and streaming features.</a:t>
-            </a:r>
-          </a:p>
-        </p:txBody>
-      </p:sp>
-      <p:pic>
-        <p:nvPicPr>
-          <p:cNvPr descr="./img/batch_prediction.png" id="0" name="Picture 1"/>
-          <p:cNvPicPr>
-            <a:picLocks noGrp="1" noChangeAspect="1"/>
-          </p:cNvPicPr>
-          <p:nvPr/>
-        </p:nvPicPr>
-        <p:blipFill>
-          <a:blip r:embed="rId2"/>
-          <a:stretch>
-            <a:fillRect/>
-          </a:stretch>
-        </p:blipFill>
-        <p:spPr bwMode="auto">
-          <a:xfrm>
-            <a:off x="6007100" y="2997200"/>
-            <a:ext cx="4660900" cy="1257300"/>
-          </a:xfrm>
-          <a:prstGeom prst="rect">
-            <a:avLst/>
-          </a:prstGeom>
-          <a:noFill/>
-          <a:ln w="9525">
-            <a:noFill/>
-            <a:headEnd/>
-            <a:tailEnd/>
-          </a:ln>
-        </p:spPr>
-      </p:pic>
-      <p:sp>
-        <p:nvSpPr>
-          <p:cNvPr id="1" name="TextBox 3"/>
-          <p:cNvSpPr txBox="1"/>
-          <p:nvPr/>
-        </p:nvSpPr>
-        <p:spPr>
-          <a:xfrm>
-            <a:off x="6007100" y="5245100"/>
-            <a:ext cx="4660900" cy="508000"/>
-          </a:xfrm>
-          <a:prstGeom prst="rect">
-            <a:avLst/>
-          </a:prstGeom>
-          <a:noFill/>
-        </p:spPr>
-        <p:txBody>
-          <a:bodyPr/>
-          <a:lstStyle/>
-          <a:p>
-            <a:pPr lvl="0" indent="0" marL="0" algn="ctr">
-              <a:buNone/>
-            </a:pPr>
-            <a:r>
-              <a:rPr/>
-              <a:t>Batch Prediction (based on Huyen 2021)</a:t>
-            </a:r>
+              <a:t>Scale means different things to different applications.</a:t>
+            </a:r>
+          </a:p>
+          <a:p>
+            <a:pPr lvl="0"/>
+            <a:r>
+              <a:t>Number of users, availability, speed or volume of data.</a:t>
+            </a:r>
+          </a:p>
+        </p:txBody>
+      </p:sp>
+      <p:sp>
+        <p:nvSpPr>
+          <p:cNvPr id="5" name="Date Placeholder 4">
+            <a:extLst>
+              <a:ext uri="{FF2B5EF4-FFF2-40B4-BE49-F238E27FC236}">
+                <a16:creationId xmlns:a16="http://schemas.microsoft.com/office/drawing/2014/main" id="{3E3C1A34-3D28-7D23-0698-5E2EFE1AE040}"/>
+              </a:ext>
+            </a:extLst>
+          </p:cNvPr>
+          <p:cNvSpPr>
+            <a:spLocks noGrp="1"/>
+          </p:cNvSpPr>
+          <p:nvPr>
+            <p:ph type="dt" sz="half" idx="10"/>
+          </p:nvPr>
+        </p:nvSpPr>
+        <p:spPr/>
+        <p:txBody>
+          <a:bodyPr/>
+          <a:lstStyle/>
+          <a:p>
+            <a:r>
+              <a:rPr lang="en-CA"/>
+              <a:t>March 2024</a:t>
+            </a:r>
+          </a:p>
+        </p:txBody>
+      </p:sp>
+      <p:sp>
+        <p:nvSpPr>
+          <p:cNvPr id="6" name="Footer Placeholder 5">
+            <a:extLst>
+              <a:ext uri="{FF2B5EF4-FFF2-40B4-BE49-F238E27FC236}">
+                <a16:creationId xmlns:a16="http://schemas.microsoft.com/office/drawing/2014/main" id="{66663F33-217C-4E91-D220-A13ACDD54235}"/>
+              </a:ext>
+            </a:extLst>
+          </p:cNvPr>
+          <p:cNvSpPr>
+            <a:spLocks noGrp="1"/>
+          </p:cNvSpPr>
+          <p:nvPr>
+            <p:ph type="ftr" sz="quarter" idx="11"/>
+          </p:nvPr>
+        </p:nvSpPr>
+        <p:spPr/>
+        <p:txBody>
+          <a:bodyPr/>
+          <a:lstStyle/>
+          <a:p>
+            <a:r>
+              <a:rPr lang="en-CA"/>
+              <a:t>Production - Model Deployment</a:t>
+            </a:r>
+          </a:p>
+        </p:txBody>
+      </p:sp>
+      <p:sp>
+        <p:nvSpPr>
+          <p:cNvPr id="7" name="Slide Number Placeholder 6">
+            <a:extLst>
+              <a:ext uri="{FF2B5EF4-FFF2-40B4-BE49-F238E27FC236}">
+                <a16:creationId xmlns:a16="http://schemas.microsoft.com/office/drawing/2014/main" id="{C2FFAF37-16BA-94DD-D1E4-F729C62EB751}"/>
+              </a:ext>
+            </a:extLst>
+          </p:cNvPr>
+          <p:cNvSpPr>
+            <a:spLocks noGrp="1"/>
+          </p:cNvSpPr>
+          <p:nvPr>
+            <p:ph type="sldNum" sz="quarter" idx="12"/>
+          </p:nvPr>
+        </p:nvSpPr>
+        <p:spPr/>
+        <p:txBody>
+          <a:bodyPr/>
+          <a:lstStyle/>
+          <a:p>
+            <a:fld id="{4F4BDF5D-830C-4829-B676-EE421164B1C8}" type="slidenum">
+              <a:rPr lang="en-CA" smtClean="0"/>
+              <a:t>10</a:t>
+            </a:fld>
+            <a:endParaRPr lang="en-CA"/>
           </a:p>
         </p:txBody>
       </p:sp>
     </p:spTree>
   </p:cSld>
+  <p:clrMapOvr>
+    <a:masterClrMapping/>
+  </p:clrMapOvr>
 </p:sld>
 </file>
 
@@ -3641,19 +4108,299 @@
           <a:bodyPr/>
           <a:lstStyle/>
           <a:p>
-            <a:pPr lvl="0" indent="0" marL="0">
+            <a:pPr marL="0" lvl="0" indent="0">
               <a:buNone/>
             </a:pPr>
             <a:r>
-              <a:rPr/>
-              <a:t>Model Prediction (Inference) Service (cont.)</a:t>
+              <a:t>Batch Prediction Vs Online Prediction</a:t>
+            </a:r>
+          </a:p>
+        </p:txBody>
+      </p:sp>
+      <p:sp>
+        <p:nvSpPr>
+          <p:cNvPr id="3" name="Content Placeholder 2"/>
+          <p:cNvSpPr>
+            <a:spLocks noGrp="1"/>
+          </p:cNvSpPr>
+          <p:nvPr>
+            <p:ph sz="half" idx="1"/>
+          </p:nvPr>
+        </p:nvSpPr>
+        <p:spPr/>
+        <p:txBody>
+          <a:bodyPr>
+            <a:normAutofit fontScale="85000" lnSpcReduction="20000"/>
+          </a:bodyPr>
+          <a:lstStyle/>
+          <a:p>
+            <a:pPr marL="0" lvl="0" indent="0">
+              <a:buNone/>
+            </a:pPr>
+            <a:r>
+              <a:rPr b="1"/>
+              <a:t>Online Prediction</a:t>
+            </a:r>
+          </a:p>
+          <a:p>
+            <a:pPr lvl="0"/>
+            <a:r>
+              <a:t>Predictions are generated and returned as soon as requests for these predictions arrive.</a:t>
+            </a:r>
+          </a:p>
+          <a:p>
+            <a:pPr lvl="0"/>
+            <a:r>
+              <a:t>Also known as on-demand prediction.</a:t>
+            </a:r>
+          </a:p>
+          <a:p>
+            <a:pPr lvl="0"/>
+            <a:r>
+              <a:t>Traditionally, requests are made to a prediction service via a RESTful API.</a:t>
+            </a:r>
+          </a:p>
+          <a:p>
+            <a:pPr lvl="0"/>
+            <a:r>
+              <a:t>When requests are made via HTTP, online prediction is known as </a:t>
+            </a:r>
+            <a:r>
+              <a:rPr i="1"/>
+              <a:t>synchronous prediction</a:t>
+            </a:r>
+            <a:r>
+              <a:t>.</a:t>
+            </a:r>
+          </a:p>
+        </p:txBody>
+      </p:sp>
+      <p:sp>
+        <p:nvSpPr>
+          <p:cNvPr id="4" name="Content Placeholder 3"/>
+          <p:cNvSpPr>
+            <a:spLocks noGrp="1"/>
+          </p:cNvSpPr>
+          <p:nvPr>
+            <p:ph sz="half" idx="2"/>
+          </p:nvPr>
+        </p:nvSpPr>
+        <p:spPr/>
+        <p:txBody>
+          <a:bodyPr>
+            <a:normAutofit fontScale="85000" lnSpcReduction="20000"/>
+          </a:bodyPr>
+          <a:lstStyle/>
+          <a:p>
+            <a:pPr marL="0" lvl="0" indent="0">
+              <a:buNone/>
+            </a:pPr>
+            <a:r>
+              <a:rPr b="1"/>
+              <a:t>Batch Prediction</a:t>
+            </a:r>
+          </a:p>
+          <a:p>
+            <a:pPr lvl="0"/>
+            <a:r>
+              <a:t>Predictions are generated periodically or whenever triggered.</a:t>
+            </a:r>
+          </a:p>
+          <a:p>
+            <a:pPr lvl="0"/>
+            <a:r>
+              <a:t>Predictions are stored in SQL tables or in memory. They are later retrieved as needed.</a:t>
+            </a:r>
+          </a:p>
+          <a:p>
+            <a:pPr lvl="0"/>
+            <a:r>
+              <a:t>Batch prediction is also known as asynchronous prediction.</a:t>
+            </a:r>
+          </a:p>
+        </p:txBody>
+      </p:sp>
+      <p:sp>
+        <p:nvSpPr>
+          <p:cNvPr id="5" name="Date Placeholder 4">
+            <a:extLst>
+              <a:ext uri="{FF2B5EF4-FFF2-40B4-BE49-F238E27FC236}">
+                <a16:creationId xmlns:a16="http://schemas.microsoft.com/office/drawing/2014/main" id="{8445E289-0481-001B-7A9B-BEC14B8C80BD}"/>
+              </a:ext>
+            </a:extLst>
+          </p:cNvPr>
+          <p:cNvSpPr>
+            <a:spLocks noGrp="1"/>
+          </p:cNvSpPr>
+          <p:nvPr>
+            <p:ph type="dt" sz="half" idx="10"/>
+          </p:nvPr>
+        </p:nvSpPr>
+        <p:spPr/>
+        <p:txBody>
+          <a:bodyPr/>
+          <a:lstStyle/>
+          <a:p>
+            <a:r>
+              <a:rPr lang="en-CA"/>
+              <a:t>March 2024</a:t>
+            </a:r>
+          </a:p>
+        </p:txBody>
+      </p:sp>
+      <p:sp>
+        <p:nvSpPr>
+          <p:cNvPr id="6" name="Footer Placeholder 5">
+            <a:extLst>
+              <a:ext uri="{FF2B5EF4-FFF2-40B4-BE49-F238E27FC236}">
+                <a16:creationId xmlns:a16="http://schemas.microsoft.com/office/drawing/2014/main" id="{F84B69FA-BCB4-0696-36B9-DEC8A71AFA3C}"/>
+              </a:ext>
+            </a:extLst>
+          </p:cNvPr>
+          <p:cNvSpPr>
+            <a:spLocks noGrp="1"/>
+          </p:cNvSpPr>
+          <p:nvPr>
+            <p:ph type="ftr" sz="quarter" idx="11"/>
+          </p:nvPr>
+        </p:nvSpPr>
+        <p:spPr/>
+        <p:txBody>
+          <a:bodyPr/>
+          <a:lstStyle/>
+          <a:p>
+            <a:r>
+              <a:rPr lang="en-CA"/>
+              <a:t>Production - Model Deployment</a:t>
+            </a:r>
+          </a:p>
+        </p:txBody>
+      </p:sp>
+      <p:sp>
+        <p:nvSpPr>
+          <p:cNvPr id="7" name="Slide Number Placeholder 6">
+            <a:extLst>
+              <a:ext uri="{FF2B5EF4-FFF2-40B4-BE49-F238E27FC236}">
+                <a16:creationId xmlns:a16="http://schemas.microsoft.com/office/drawing/2014/main" id="{4D843CBF-86D7-1841-E2F3-B415F8356AF1}"/>
+              </a:ext>
+            </a:extLst>
+          </p:cNvPr>
+          <p:cNvSpPr>
+            <a:spLocks noGrp="1"/>
+          </p:cNvSpPr>
+          <p:nvPr>
+            <p:ph type="sldNum" sz="quarter" idx="12"/>
+          </p:nvPr>
+        </p:nvSpPr>
+        <p:spPr/>
+        <p:txBody>
+          <a:bodyPr/>
+          <a:lstStyle/>
+          <a:p>
+            <a:fld id="{4F4BDF5D-830C-4829-B676-EE421164B1C8}" type="slidenum">
+              <a:rPr lang="en-CA" smtClean="0"/>
+              <a:t>11</a:t>
+            </a:fld>
+            <a:endParaRPr lang="en-CA"/>
+          </a:p>
+        </p:txBody>
+      </p:sp>
+    </p:spTree>
+  </p:cSld>
+  <p:clrMapOvr>
+    <a:masterClrMapping/>
+  </p:clrMapOvr>
+</p:sld>
+</file>
+
+<file path=ppt/slides/slide12.xml><?xml version="1.0" encoding="utf-8"?>
+<p:sld xmlns:a="http://schemas.openxmlformats.org/drawingml/2006/main" xmlns:r="http://schemas.openxmlformats.org/officeDocument/2006/relationships" xmlns:p="http://schemas.openxmlformats.org/presentationml/2006/main">
+  <p:cSld>
+    <p:spTree>
+      <p:nvGrpSpPr>
+        <p:cNvPr id="1" name=""/>
+        <p:cNvGrpSpPr/>
+        <p:nvPr/>
+      </p:nvGrpSpPr>
+      <p:grpSpPr>
+        <a:xfrm>
+          <a:off x="0" y="0"/>
+          <a:ext cx="0" cy="0"/>
+          <a:chOff x="0" y="0"/>
+          <a:chExt cx="0" cy="0"/>
+        </a:xfrm>
+      </p:grpSpPr>
+      <p:sp>
+        <p:nvSpPr>
+          <p:cNvPr id="2" name="Title 1"/>
+          <p:cNvSpPr>
+            <a:spLocks noGrp="1"/>
+          </p:cNvSpPr>
+          <p:nvPr>
+            <p:ph type="title"/>
+          </p:nvPr>
+        </p:nvSpPr>
+        <p:spPr/>
+        <p:txBody>
+          <a:bodyPr/>
+          <a:lstStyle/>
+          <a:p>
+            <a:pPr marL="0" lvl="0" indent="0">
+              <a:buNone/>
+            </a:pPr>
+            <a:r>
+              <a:t>Model Prediction Service</a:t>
+            </a:r>
+          </a:p>
+        </p:txBody>
+      </p:sp>
+      <p:sp>
+        <p:nvSpPr>
+          <p:cNvPr id="3" name="Content Placeholder 2"/>
+          <p:cNvSpPr>
+            <a:spLocks noGrp="1"/>
+          </p:cNvSpPr>
+          <p:nvPr>
+            <p:ph sz="half" idx="1"/>
+          </p:nvPr>
+        </p:nvSpPr>
+        <p:spPr/>
+        <p:txBody>
+          <a:bodyPr>
+            <a:normAutofit fontScale="92500" lnSpcReduction="20000"/>
+          </a:bodyPr>
+          <a:lstStyle/>
+          <a:p>
+            <a:pPr marL="0" lvl="0" indent="0">
+              <a:buNone/>
+            </a:pPr>
+            <a:r>
+              <a:t>Three types of model prediction or inference service:</a:t>
+            </a:r>
+          </a:p>
+          <a:p>
+            <a:pPr lvl="0"/>
+            <a:r>
+              <a:t>Batch prediction: uses only batch features.</a:t>
+            </a:r>
+          </a:p>
+          <a:p>
+            <a:pPr lvl="0"/>
+            <a:r>
+              <a:t>Online prediction that uses only batch features (e.g., precomputed embeddings).</a:t>
+            </a:r>
+          </a:p>
+          <a:p>
+            <a:pPr lvl="0"/>
+            <a:r>
+              <a:t>Online streaming prediction: uses batch features and streaming features.</a:t>
             </a:r>
           </a:p>
         </p:txBody>
       </p:sp>
       <p:pic>
         <p:nvPicPr>
-          <p:cNvPr descr="./img/online_prediction.png" id="0" name="Picture 1"/>
+          <p:cNvPr id="4" name="Picture 1" descr="./img/batch_prediction.png"/>
           <p:cNvPicPr>
             <a:picLocks noGrp="1" noChangeAspect="1"/>
           </p:cNvPicPr>
@@ -3667,7 +4414,201 @@
         </p:blipFill>
         <p:spPr bwMode="auto">
           <a:xfrm>
-            <a:off x="673100" y="2654300"/>
+            <a:off x="5279458" y="2800915"/>
+            <a:ext cx="6116184" cy="1649870"/>
+          </a:xfrm>
+          <a:prstGeom prst="rect">
+            <a:avLst/>
+          </a:prstGeom>
+          <a:noFill/>
+          <a:ln w="9525">
+            <a:noFill/>
+            <a:headEnd/>
+            <a:tailEnd/>
+          </a:ln>
+        </p:spPr>
+      </p:pic>
+      <p:sp>
+        <p:nvSpPr>
+          <p:cNvPr id="5" name="TextBox 3"/>
+          <p:cNvSpPr txBox="1"/>
+          <p:nvPr/>
+        </p:nvSpPr>
+        <p:spPr>
+          <a:xfrm>
+            <a:off x="6007100" y="5245100"/>
+            <a:ext cx="4660900" cy="508000"/>
+          </a:xfrm>
+          <a:prstGeom prst="rect">
+            <a:avLst/>
+          </a:prstGeom>
+          <a:noFill/>
+        </p:spPr>
+        <p:txBody>
+          <a:bodyPr/>
+          <a:lstStyle/>
+          <a:p>
+            <a:pPr marL="0" lvl="0" indent="0" algn="ctr">
+              <a:buNone/>
+            </a:pPr>
+            <a:r>
+              <a:rPr sz="1100"/>
+              <a:t>Batch Prediction (based on Huyen 2021)</a:t>
+            </a:r>
+          </a:p>
+        </p:txBody>
+      </p:sp>
+      <p:sp>
+        <p:nvSpPr>
+          <p:cNvPr id="6" name="Date Placeholder 5">
+            <a:extLst>
+              <a:ext uri="{FF2B5EF4-FFF2-40B4-BE49-F238E27FC236}">
+                <a16:creationId xmlns:a16="http://schemas.microsoft.com/office/drawing/2014/main" id="{F6B1FDEE-CDD8-E483-A066-0AC52DA6AFDC}"/>
+              </a:ext>
+            </a:extLst>
+          </p:cNvPr>
+          <p:cNvSpPr>
+            <a:spLocks noGrp="1"/>
+          </p:cNvSpPr>
+          <p:nvPr>
+            <p:ph type="dt" sz="half" idx="10"/>
+          </p:nvPr>
+        </p:nvSpPr>
+        <p:spPr/>
+        <p:txBody>
+          <a:bodyPr/>
+          <a:lstStyle/>
+          <a:p>
+            <a:r>
+              <a:rPr lang="en-CA"/>
+              <a:t>March 2024</a:t>
+            </a:r>
+          </a:p>
+        </p:txBody>
+      </p:sp>
+      <p:sp>
+        <p:nvSpPr>
+          <p:cNvPr id="7" name="Footer Placeholder 6">
+            <a:extLst>
+              <a:ext uri="{FF2B5EF4-FFF2-40B4-BE49-F238E27FC236}">
+                <a16:creationId xmlns:a16="http://schemas.microsoft.com/office/drawing/2014/main" id="{E2B2653D-32D5-682D-D728-B2B0BE4230C9}"/>
+              </a:ext>
+            </a:extLst>
+          </p:cNvPr>
+          <p:cNvSpPr>
+            <a:spLocks noGrp="1"/>
+          </p:cNvSpPr>
+          <p:nvPr>
+            <p:ph type="ftr" sz="quarter" idx="11"/>
+          </p:nvPr>
+        </p:nvSpPr>
+        <p:spPr/>
+        <p:txBody>
+          <a:bodyPr/>
+          <a:lstStyle/>
+          <a:p>
+            <a:r>
+              <a:rPr lang="en-CA"/>
+              <a:t>Production - Model Deployment</a:t>
+            </a:r>
+          </a:p>
+        </p:txBody>
+      </p:sp>
+      <p:sp>
+        <p:nvSpPr>
+          <p:cNvPr id="8" name="Slide Number Placeholder 7">
+            <a:extLst>
+              <a:ext uri="{FF2B5EF4-FFF2-40B4-BE49-F238E27FC236}">
+                <a16:creationId xmlns:a16="http://schemas.microsoft.com/office/drawing/2014/main" id="{9ECFB94E-2F3B-8867-145E-3982EB9C4144}"/>
+              </a:ext>
+            </a:extLst>
+          </p:cNvPr>
+          <p:cNvSpPr>
+            <a:spLocks noGrp="1"/>
+          </p:cNvSpPr>
+          <p:nvPr>
+            <p:ph type="sldNum" sz="quarter" idx="12"/>
+          </p:nvPr>
+        </p:nvSpPr>
+        <p:spPr/>
+        <p:txBody>
+          <a:bodyPr/>
+          <a:lstStyle/>
+          <a:p>
+            <a:fld id="{4F4BDF5D-830C-4829-B676-EE421164B1C8}" type="slidenum">
+              <a:rPr lang="en-CA" smtClean="0"/>
+              <a:t>12</a:t>
+            </a:fld>
+            <a:endParaRPr lang="en-CA"/>
+          </a:p>
+        </p:txBody>
+      </p:sp>
+    </p:spTree>
+  </p:cSld>
+  <p:clrMapOvr>
+    <a:masterClrMapping/>
+  </p:clrMapOvr>
+</p:sld>
+</file>
+
+<file path=ppt/slides/slide13.xml><?xml version="1.0" encoding="utf-8"?>
+<p:sld xmlns:a="http://schemas.openxmlformats.org/drawingml/2006/main" xmlns:r="http://schemas.openxmlformats.org/officeDocument/2006/relationships" xmlns:p="http://schemas.openxmlformats.org/presentationml/2006/main">
+  <p:cSld>
+    <p:spTree>
+      <p:nvGrpSpPr>
+        <p:cNvPr id="1" name=""/>
+        <p:cNvGrpSpPr/>
+        <p:nvPr/>
+      </p:nvGrpSpPr>
+      <p:grpSpPr>
+        <a:xfrm>
+          <a:off x="0" y="0"/>
+          <a:ext cx="0" cy="0"/>
+          <a:chOff x="0" y="0"/>
+          <a:chExt cx="0" cy="0"/>
+        </a:xfrm>
+      </p:grpSpPr>
+      <p:sp>
+        <p:nvSpPr>
+          <p:cNvPr id="2" name="Title 1"/>
+          <p:cNvSpPr>
+            <a:spLocks noGrp="1"/>
+          </p:cNvSpPr>
+          <p:nvPr>
+            <p:ph type="title"/>
+          </p:nvPr>
+        </p:nvSpPr>
+        <p:spPr/>
+        <p:txBody>
+          <a:bodyPr/>
+          <a:lstStyle/>
+          <a:p>
+            <a:pPr marL="0" lvl="0" indent="0">
+              <a:buNone/>
+            </a:pPr>
+            <a:r>
+              <a:t>Model Prediction Service (cont.)</a:t>
+            </a:r>
+          </a:p>
+        </p:txBody>
+      </p:sp>
+      <p:pic>
+        <p:nvPicPr>
+          <p:cNvPr id="3" name="Picture 1" descr="./img/online_prediction.png"/>
+          <p:cNvPicPr>
+            <a:picLocks noGrp="1" noChangeAspect="1"/>
+          </p:cNvPicPr>
+          <p:nvPr/>
+        </p:nvPicPr>
+        <p:blipFill>
+          <a:blip r:embed="rId2"/>
+          <a:stretch>
+            <a:fillRect/>
+          </a:stretch>
+        </p:blipFill>
+        <p:spPr bwMode="auto">
+          <a:xfrm>
+            <a:off x="673100" y="2663825"/>
             <a:ext cx="4660900" cy="1930400"/>
           </a:xfrm>
           <a:prstGeom prst="rect">
@@ -3683,7 +4624,7 @@
       </p:pic>
       <p:sp>
         <p:nvSpPr>
-          <p:cNvPr id="1" name="TextBox 3"/>
+          <p:cNvPr id="4" name="TextBox 3"/>
           <p:cNvSpPr txBox="1"/>
           <p:nvPr/>
         </p:nvSpPr>
@@ -3701,19 +4642,27 @@
           <a:bodyPr/>
           <a:lstStyle/>
           <a:p>
-            <a:pPr lvl="0" indent="0" marL="0" algn="ctr">
+            <a:pPr marL="0" lvl="0" indent="0" algn="ctr">
               <a:buNone/>
             </a:pPr>
             <a:r>
-              <a:rPr/>
-              <a:t>Online Prediction (based on Huyen 2021)</a:t>
+              <a:rPr sz="1100" dirty="0"/>
+              <a:t>Online Prediction (based on </a:t>
+            </a:r>
+            <a:r>
+              <a:rPr sz="1100" dirty="0" err="1"/>
+              <a:t>Huyen</a:t>
+            </a:r>
+            <a:r>
+              <a:rPr sz="1100" dirty="0"/>
+              <a:t> 2021)</a:t>
             </a:r>
           </a:p>
         </p:txBody>
       </p:sp>
       <p:pic>
         <p:nvPicPr>
-          <p:cNvPr descr="./img/streaming_prediction.png" id="0" name="Picture 1"/>
+          <p:cNvPr id="5" name="Picture 1" descr="./img/streaming_prediction.png"/>
           <p:cNvPicPr>
             <a:picLocks noGrp="1" noChangeAspect="1"/>
           </p:cNvPicPr>
@@ -3743,7 +4692,7 @@
       </p:pic>
       <p:sp>
         <p:nvSpPr>
-          <p:cNvPr id="1" name="TextBox 3"/>
+          <p:cNvPr id="6" name="TextBox 3"/>
           <p:cNvSpPr txBox="1"/>
           <p:nvPr/>
         </p:nvSpPr>
@@ -3761,18 +4710,268 @@
           <a:bodyPr/>
           <a:lstStyle/>
           <a:p>
-            <a:pPr lvl="0" indent="0" marL="0" algn="ctr">
+            <a:pPr marL="0" lvl="0" indent="0" algn="ctr">
               <a:buNone/>
             </a:pPr>
             <a:r>
-              <a:rPr/>
+              <a:rPr sz="1100"/>
               <a:t>Streaming Prediction (based on Huyen 2021)</a:t>
             </a:r>
+          </a:p>
+        </p:txBody>
+      </p:sp>
+      <p:sp>
+        <p:nvSpPr>
+          <p:cNvPr id="7" name="Date Placeholder 6">
+            <a:extLst>
+              <a:ext uri="{FF2B5EF4-FFF2-40B4-BE49-F238E27FC236}">
+                <a16:creationId xmlns:a16="http://schemas.microsoft.com/office/drawing/2014/main" id="{97A9E9F1-5BE3-AA7B-7991-37702E5BC10B}"/>
+              </a:ext>
+            </a:extLst>
+          </p:cNvPr>
+          <p:cNvSpPr>
+            <a:spLocks noGrp="1"/>
+          </p:cNvSpPr>
+          <p:nvPr>
+            <p:ph type="dt" sz="half" idx="10"/>
+          </p:nvPr>
+        </p:nvSpPr>
+        <p:spPr/>
+        <p:txBody>
+          <a:bodyPr/>
+          <a:lstStyle/>
+          <a:p>
+            <a:r>
+              <a:rPr lang="en-CA"/>
+              <a:t>March 2024</a:t>
+            </a:r>
+          </a:p>
+        </p:txBody>
+      </p:sp>
+      <p:sp>
+        <p:nvSpPr>
+          <p:cNvPr id="8" name="Footer Placeholder 7">
+            <a:extLst>
+              <a:ext uri="{FF2B5EF4-FFF2-40B4-BE49-F238E27FC236}">
+                <a16:creationId xmlns:a16="http://schemas.microsoft.com/office/drawing/2014/main" id="{75DFA833-B195-4A97-9C40-833F82F8D0BA}"/>
+              </a:ext>
+            </a:extLst>
+          </p:cNvPr>
+          <p:cNvSpPr>
+            <a:spLocks noGrp="1"/>
+          </p:cNvSpPr>
+          <p:nvPr>
+            <p:ph type="ftr" sz="quarter" idx="11"/>
+          </p:nvPr>
+        </p:nvSpPr>
+        <p:spPr/>
+        <p:txBody>
+          <a:bodyPr/>
+          <a:lstStyle/>
+          <a:p>
+            <a:r>
+              <a:rPr lang="en-CA"/>
+              <a:t>Production - Model Deployment</a:t>
+            </a:r>
+          </a:p>
+        </p:txBody>
+      </p:sp>
+      <p:sp>
+        <p:nvSpPr>
+          <p:cNvPr id="9" name="Slide Number Placeholder 8">
+            <a:extLst>
+              <a:ext uri="{FF2B5EF4-FFF2-40B4-BE49-F238E27FC236}">
+                <a16:creationId xmlns:a16="http://schemas.microsoft.com/office/drawing/2014/main" id="{FC1639AF-E4D8-8D6B-2480-54A59B58E62E}"/>
+              </a:ext>
+            </a:extLst>
+          </p:cNvPr>
+          <p:cNvSpPr>
+            <a:spLocks noGrp="1"/>
+          </p:cNvSpPr>
+          <p:nvPr>
+            <p:ph type="sldNum" sz="quarter" idx="12"/>
+          </p:nvPr>
+        </p:nvSpPr>
+        <p:spPr/>
+        <p:txBody>
+          <a:bodyPr/>
+          <a:lstStyle/>
+          <a:p>
+            <a:fld id="{4F4BDF5D-830C-4829-B676-EE421164B1C8}" type="slidenum">
+              <a:rPr lang="en-CA" smtClean="0"/>
+              <a:t>13</a:t>
+            </a:fld>
+            <a:endParaRPr lang="en-CA"/>
           </a:p>
         </p:txBody>
       </p:sp>
     </p:spTree>
   </p:cSld>
+  <p:clrMapOvr>
+    <a:masterClrMapping/>
+  </p:clrMapOvr>
+</p:sld>
+</file>
+
+<file path=ppt/slides/slide14.xml><?xml version="1.0" encoding="utf-8"?>
+<p:sld xmlns:a="http://schemas.openxmlformats.org/drawingml/2006/main" xmlns:r="http://schemas.openxmlformats.org/officeDocument/2006/relationships" xmlns:p="http://schemas.openxmlformats.org/presentationml/2006/main">
+  <p:cSld>
+    <p:spTree>
+      <p:nvGrpSpPr>
+        <p:cNvPr id="1" name=""/>
+        <p:cNvGrpSpPr/>
+        <p:nvPr/>
+      </p:nvGrpSpPr>
+      <p:grpSpPr>
+        <a:xfrm>
+          <a:off x="0" y="0"/>
+          <a:ext cx="0" cy="0"/>
+          <a:chOff x="0" y="0"/>
+          <a:chExt cx="0" cy="0"/>
+        </a:xfrm>
+      </p:grpSpPr>
+      <p:sp>
+        <p:nvSpPr>
+          <p:cNvPr id="2" name="Title 1"/>
+          <p:cNvSpPr>
+            <a:spLocks noGrp="1"/>
+          </p:cNvSpPr>
+          <p:nvPr>
+            <p:ph type="title"/>
+          </p:nvPr>
+        </p:nvSpPr>
+        <p:spPr/>
+        <p:txBody>
+          <a:bodyPr/>
+          <a:lstStyle/>
+          <a:p>
+            <a:pPr marL="0" lvl="0" indent="0">
+              <a:buNone/>
+            </a:pPr>
+            <a:r>
+              <a:t>References</a:t>
+            </a:r>
+          </a:p>
+        </p:txBody>
+      </p:sp>
+      <p:sp>
+        <p:nvSpPr>
+          <p:cNvPr id="3" name="Content Placeholder 2"/>
+          <p:cNvSpPr>
+            <a:spLocks noGrp="1"/>
+          </p:cNvSpPr>
+          <p:nvPr>
+            <p:ph idx="1"/>
+          </p:nvPr>
+        </p:nvSpPr>
+        <p:spPr/>
+        <p:txBody>
+          <a:bodyPr/>
+          <a:lstStyle/>
+          <a:p>
+            <a:pPr lvl="0"/>
+            <a:r>
+              <a:t>Agrawal, A. et al. “Cloudy with a high chance of DBMS: A 10-year prediction for Enterprise-Grade ML.” arXiv preprint arXiv:1909.00084 (2019).</a:t>
+            </a:r>
+          </a:p>
+          <a:p>
+            <a:pPr lvl="0"/>
+            <a:r>
+              <a:t>Huyen, Chip. “Designing machine learning systems.” O’Reilly Media, Inc.(2021).</a:t>
+            </a:r>
+          </a:p>
+        </p:txBody>
+      </p:sp>
+      <p:sp>
+        <p:nvSpPr>
+          <p:cNvPr id="4" name="Date Placeholder 3">
+            <a:extLst>
+              <a:ext uri="{FF2B5EF4-FFF2-40B4-BE49-F238E27FC236}">
+                <a16:creationId xmlns:a16="http://schemas.microsoft.com/office/drawing/2014/main" id="{DF48DBB5-F7E1-F338-149D-AECC4B4D5F4A}"/>
+              </a:ext>
+            </a:extLst>
+          </p:cNvPr>
+          <p:cNvSpPr>
+            <a:spLocks noGrp="1"/>
+          </p:cNvSpPr>
+          <p:nvPr>
+            <p:ph type="dt" sz="half" idx="10"/>
+          </p:nvPr>
+        </p:nvSpPr>
+        <p:spPr/>
+        <p:txBody>
+          <a:bodyPr/>
+          <a:lstStyle/>
+          <a:p>
+            <a:r>
+              <a:rPr lang="en-CA"/>
+              <a:t>March 2024</a:t>
+            </a:r>
+          </a:p>
+        </p:txBody>
+      </p:sp>
+      <p:sp>
+        <p:nvSpPr>
+          <p:cNvPr id="5" name="Footer Placeholder 4">
+            <a:extLst>
+              <a:ext uri="{FF2B5EF4-FFF2-40B4-BE49-F238E27FC236}">
+                <a16:creationId xmlns:a16="http://schemas.microsoft.com/office/drawing/2014/main" id="{10627AB1-DEBA-B27F-170A-E65DF9C8FBDD}"/>
+              </a:ext>
+            </a:extLst>
+          </p:cNvPr>
+          <p:cNvSpPr>
+            <a:spLocks noGrp="1"/>
+          </p:cNvSpPr>
+          <p:nvPr>
+            <p:ph type="ftr" sz="quarter" idx="11"/>
+          </p:nvPr>
+        </p:nvSpPr>
+        <p:spPr/>
+        <p:txBody>
+          <a:bodyPr/>
+          <a:lstStyle/>
+          <a:p>
+            <a:r>
+              <a:rPr lang="en-CA"/>
+              <a:t>Production - Model Deployment</a:t>
+            </a:r>
+          </a:p>
+        </p:txBody>
+      </p:sp>
+      <p:sp>
+        <p:nvSpPr>
+          <p:cNvPr id="6" name="Slide Number Placeholder 5">
+            <a:extLst>
+              <a:ext uri="{FF2B5EF4-FFF2-40B4-BE49-F238E27FC236}">
+                <a16:creationId xmlns:a16="http://schemas.microsoft.com/office/drawing/2014/main" id="{F7FDDBBC-65A4-F8E6-F610-7126EB3E298A}"/>
+              </a:ext>
+            </a:extLst>
+          </p:cNvPr>
+          <p:cNvSpPr>
+            <a:spLocks noGrp="1"/>
+          </p:cNvSpPr>
+          <p:nvPr>
+            <p:ph type="sldNum" sz="quarter" idx="12"/>
+          </p:nvPr>
+        </p:nvSpPr>
+        <p:spPr/>
+        <p:txBody>
+          <a:bodyPr/>
+          <a:lstStyle/>
+          <a:p>
+            <a:fld id="{4F4BDF5D-830C-4829-B676-EE421164B1C8}" type="slidenum">
+              <a:rPr lang="en-CA" smtClean="0"/>
+              <a:t>14</a:t>
+            </a:fld>
+            <a:endParaRPr lang="en-CA"/>
+          </a:p>
+        </p:txBody>
+      </p:sp>
+    </p:spTree>
+  </p:cSld>
+  <p:clrMapOvr>
+    <a:masterClrMapping/>
+  </p:clrMapOvr>
 </p:sld>
 </file>
 
@@ -3813,18 +5012,105 @@
           <a:bodyPr/>
           <a:lstStyle/>
           <a:p>
-            <a:pPr lvl="0" indent="0" marL="0">
+            <a:pPr marL="0" lvl="0" indent="0">
               <a:buNone/>
             </a:pPr>
             <a:r>
-              <a:rPr/>
               <a:t>Introduction</a:t>
             </a:r>
+          </a:p>
+        </p:txBody>
+      </p:sp>
+      <p:sp>
+        <p:nvSpPr>
+          <p:cNvPr id="3" name="Date Placeholder 2">
+            <a:extLst>
+              <a:ext uri="{FF2B5EF4-FFF2-40B4-BE49-F238E27FC236}">
+                <a16:creationId xmlns:a16="http://schemas.microsoft.com/office/drawing/2014/main" id="{52985419-7548-FBFF-9BDF-14BD0291F318}"/>
+              </a:ext>
+            </a:extLst>
+          </p:cNvPr>
+          <p:cNvSpPr>
+            <a:spLocks noGrp="1"/>
+          </p:cNvSpPr>
+          <p:nvPr>
+            <p:ph type="dt" sz="half" idx="10"/>
+          </p:nvPr>
+        </p:nvSpPr>
+        <p:spPr/>
+        <p:txBody>
+          <a:bodyPr/>
+          <a:lstStyle/>
+          <a:p>
+            <a:r>
+              <a:rPr lang="en-CA"/>
+              <a:t>March 2024</a:t>
+            </a:r>
+          </a:p>
+        </p:txBody>
+      </p:sp>
+      <p:sp>
+        <p:nvSpPr>
+          <p:cNvPr id="4" name="Footer Placeholder 3">
+            <a:extLst>
+              <a:ext uri="{FF2B5EF4-FFF2-40B4-BE49-F238E27FC236}">
+                <a16:creationId xmlns:a16="http://schemas.microsoft.com/office/drawing/2014/main" id="{EFECEC87-6F18-612C-0789-D537440A8935}"/>
+              </a:ext>
+            </a:extLst>
+          </p:cNvPr>
+          <p:cNvSpPr>
+            <a:spLocks noGrp="1"/>
+          </p:cNvSpPr>
+          <p:nvPr>
+            <p:ph type="ftr" sz="quarter" idx="11"/>
+          </p:nvPr>
+        </p:nvSpPr>
+        <p:spPr/>
+        <p:txBody>
+          <a:bodyPr/>
+          <a:lstStyle/>
+          <a:p>
+            <a:r>
+              <a:rPr lang="en-CA"/>
+              <a:t>Production - Model Deployment</a:t>
+            </a:r>
+          </a:p>
+        </p:txBody>
+      </p:sp>
+      <p:sp>
+        <p:nvSpPr>
+          <p:cNvPr id="5" name="Slide Number Placeholder 4">
+            <a:extLst>
+              <a:ext uri="{FF2B5EF4-FFF2-40B4-BE49-F238E27FC236}">
+                <a16:creationId xmlns:a16="http://schemas.microsoft.com/office/drawing/2014/main" id="{860D20CF-AD2F-5AF0-F23E-456C1AAE0757}"/>
+              </a:ext>
+            </a:extLst>
+          </p:cNvPr>
+          <p:cNvSpPr>
+            <a:spLocks noGrp="1"/>
+          </p:cNvSpPr>
+          <p:nvPr>
+            <p:ph type="sldNum" sz="quarter" idx="12"/>
+          </p:nvPr>
+        </p:nvSpPr>
+        <p:spPr/>
+        <p:txBody>
+          <a:bodyPr/>
+          <a:lstStyle/>
+          <a:p>
+            <a:fld id="{4F4BDF5D-830C-4829-B676-EE421164B1C8}" type="slidenum">
+              <a:rPr lang="en-CA" smtClean="0"/>
+              <a:t>2</a:t>
+            </a:fld>
+            <a:endParaRPr lang="en-CA"/>
           </a:p>
         </p:txBody>
       </p:sp>
     </p:spTree>
   </p:cSld>
+  <p:clrMapOvr>
+    <a:masterClrMapping/>
+  </p:clrMapOvr>
 </p:sld>
 </file>
 
@@ -3860,11 +5146,10 @@
           <a:bodyPr/>
           <a:lstStyle/>
           <a:p>
-            <a:pPr lvl="0" indent="0" marL="0">
+            <a:pPr marL="0" lvl="0" indent="0">
               <a:buNone/>
             </a:pPr>
             <a:r>
-              <a:rPr/>
               <a:t>Agenda</a:t>
             </a:r>
           </a:p>
@@ -3877,15 +5162,15 @@
             <a:spLocks noGrp="1"/>
           </p:cNvSpPr>
           <p:nvPr>
-            <p:ph idx="1" sz="half"/>
-          </p:nvPr>
-        </p:nvSpPr>
-        <p:spPr/>
-        <p:txBody>
-          <a:bodyPr/>
-          <a:lstStyle/>
-          <a:p>
-            <a:pPr lvl="0" indent="0" marL="0">
+            <p:ph sz="half" idx="1"/>
+          </p:nvPr>
+        </p:nvSpPr>
+        <p:spPr/>
+        <p:txBody>
+          <a:bodyPr/>
+          <a:lstStyle/>
+          <a:p>
+            <a:pPr marL="0" lvl="0" indent="0">
               <a:buNone/>
             </a:pPr>
             <a:r>
@@ -3896,81 +5181,150 @@
           <a:p>
             <a:pPr lvl="0"/>
             <a:r>
-              <a:rPr/>
               <a:t>ML Deployment Myths and Anti-Patterns</a:t>
             </a:r>
           </a:p>
           <a:p>
             <a:pPr lvl="0"/>
             <a:r>
-              <a:rPr/>
               <a:t>Batch Prediction vs Online Prediction</a:t>
             </a:r>
           </a:p>
+        </p:txBody>
+      </p:sp>
+      <p:sp>
+        <p:nvSpPr>
+          <p:cNvPr id="4" name="Content Placeholder 3"/>
+          <p:cNvSpPr>
+            <a:spLocks noGrp="1"/>
+          </p:cNvSpPr>
+          <p:nvPr>
+            <p:ph sz="half" idx="2"/>
+          </p:nvPr>
+        </p:nvSpPr>
+        <p:spPr/>
+        <p:txBody>
+          <a:bodyPr/>
+          <a:lstStyle/>
+          <a:p>
+            <a:pPr marL="0" lvl="0" indent="0">
+              <a:buNone/>
+            </a:pPr>
+            <a:r>
+              <a:rPr b="1"/>
+              <a:t>6.2 Explainability Methods</a:t>
+            </a:r>
+          </a:p>
           <a:p>
             <a:pPr lvl="0"/>
             <a:r>
-              <a:rPr/>
-              <a:t>Model Compression</a:t>
+              <a:t>Partial Dependence Plots</a:t>
             </a:r>
           </a:p>
           <a:p>
             <a:pPr lvl="0"/>
             <a:r>
-              <a:rPr/>
-              <a:t>ML in the Cloud</a:t>
-            </a:r>
-          </a:p>
-        </p:txBody>
-      </p:sp>
-      <p:sp>
-        <p:nvSpPr>
-          <p:cNvPr id="4" name="Content Placeholder 3"/>
-          <p:cNvSpPr>
-            <a:spLocks noGrp="1"/>
-          </p:cNvSpPr>
-          <p:nvPr>
-            <p:ph idx="2" sz="half"/>
-          </p:nvPr>
-        </p:nvSpPr>
-        <p:spPr/>
-        <p:txBody>
-          <a:bodyPr/>
-          <a:lstStyle/>
-          <a:p>
-            <a:pPr lvl="0" indent="0" marL="0">
-              <a:buNone/>
-            </a:pPr>
-            <a:r>
-              <a:rPr b="1"/>
-              <a:t>6.2 Deployment</a:t>
+              <a:t>Permutation Importance</a:t>
             </a:r>
           </a:p>
           <a:p>
             <a:pPr lvl="0"/>
             <a:r>
-              <a:rPr/>
-              <a:t>Deployment to a DB.</a:t>
-            </a:r>
-          </a:p>
-          <a:p>
-            <a:pPr lvl="0"/>
-            <a:r>
-              <a:rPr/>
-              <a:t>Deployment to Pickle file.</a:t>
-            </a:r>
-          </a:p>
-          <a:p>
-            <a:pPr lvl="0"/>
-            <a:r>
-              <a:rPr/>
-              <a:t>Power BI and Jupyter.</a:t>
-            </a:r>
+              <a:t>Shap Values</a:t>
+            </a:r>
+          </a:p>
+        </p:txBody>
+      </p:sp>
+      <p:sp>
+        <p:nvSpPr>
+          <p:cNvPr id="5" name="Date Placeholder 4">
+            <a:extLst>
+              <a:ext uri="{FF2B5EF4-FFF2-40B4-BE49-F238E27FC236}">
+                <a16:creationId xmlns:a16="http://schemas.microsoft.com/office/drawing/2014/main" id="{DA458A17-D8C5-EA36-58A5-A55977430CE7}"/>
+              </a:ext>
+            </a:extLst>
+          </p:cNvPr>
+          <p:cNvSpPr>
+            <a:spLocks noGrp="1"/>
+          </p:cNvSpPr>
+          <p:nvPr>
+            <p:ph type="dt" sz="half" idx="10"/>
+          </p:nvPr>
+        </p:nvSpPr>
+        <p:spPr/>
+        <p:txBody>
+          <a:bodyPr/>
+          <a:lstStyle/>
+          <a:p>
+            <a:r>
+              <a:rPr lang="en-CA"/>
+              <a:t>March 2024</a:t>
+            </a:r>
+          </a:p>
+        </p:txBody>
+      </p:sp>
+      <p:sp>
+        <p:nvSpPr>
+          <p:cNvPr id="6" name="Footer Placeholder 5">
+            <a:extLst>
+              <a:ext uri="{FF2B5EF4-FFF2-40B4-BE49-F238E27FC236}">
+                <a16:creationId xmlns:a16="http://schemas.microsoft.com/office/drawing/2014/main" id="{6F24D0E7-E54A-C347-7FCC-111ECE580DF8}"/>
+              </a:ext>
+            </a:extLst>
+          </p:cNvPr>
+          <p:cNvSpPr>
+            <a:spLocks noGrp="1"/>
+          </p:cNvSpPr>
+          <p:nvPr>
+            <p:ph type="ftr" sz="quarter" idx="11"/>
+          </p:nvPr>
+        </p:nvSpPr>
+        <p:spPr/>
+        <p:txBody>
+          <a:bodyPr/>
+          <a:lstStyle/>
+          <a:p>
+            <a:r>
+              <a:rPr lang="en-CA"/>
+              <a:t>Production - Model Deployment</a:t>
+            </a:r>
+          </a:p>
+        </p:txBody>
+      </p:sp>
+      <p:sp>
+        <p:nvSpPr>
+          <p:cNvPr id="7" name="Slide Number Placeholder 6">
+            <a:extLst>
+              <a:ext uri="{FF2B5EF4-FFF2-40B4-BE49-F238E27FC236}">
+                <a16:creationId xmlns:a16="http://schemas.microsoft.com/office/drawing/2014/main" id="{CDF266DF-549C-EC1E-BF91-1C90927E286D}"/>
+              </a:ext>
+            </a:extLst>
+          </p:cNvPr>
+          <p:cNvSpPr>
+            <a:spLocks noGrp="1"/>
+          </p:cNvSpPr>
+          <p:nvPr>
+            <p:ph type="sldNum" sz="quarter" idx="12"/>
+          </p:nvPr>
+        </p:nvSpPr>
+        <p:spPr/>
+        <p:txBody>
+          <a:bodyPr/>
+          <a:lstStyle/>
+          <a:p>
+            <a:fld id="{4F4BDF5D-830C-4829-B676-EE421164B1C8}" type="slidenum">
+              <a:rPr lang="en-CA" smtClean="0"/>
+              <a:t>3</a:t>
+            </a:fld>
+            <a:endParaRPr lang="en-CA"/>
           </a:p>
         </p:txBody>
       </p:sp>
     </p:spTree>
   </p:cSld>
+  <p:clrMapOvr>
+    <a:masterClrMapping/>
+  </p:clrMapOvr>
 </p:sld>
 </file>
 
@@ -4006,12 +5360,11 @@
           <a:bodyPr/>
           <a:lstStyle/>
           <a:p>
-            <a:pPr lvl="0" indent="0" marL="0">
+            <a:pPr marL="0" lvl="0" indent="0">
               <a:buNone/>
             </a:pPr>
             <a:r>
-              <a:rPr/>
-              <a:t>About These Notes</a:t>
+              <a:t>Slides, Notebooks, and Code</a:t>
             </a:r>
           </a:p>
         </p:txBody>
@@ -4023,20 +5376,17 @@
             <a:spLocks noGrp="1"/>
           </p:cNvSpPr>
           <p:nvPr>
-            <p:ph idx="1" sz="half"/>
-          </p:nvPr>
-        </p:nvSpPr>
-        <p:spPr/>
-        <p:txBody>
-          <a:bodyPr/>
-          <a:lstStyle/>
-          <a:p>
-            <a:pPr lvl="0" indent="0" marL="0">
-              <a:buNone/>
-            </a:pPr>
-            <a:r>
-              <a:rPr/>
-              <a:t>These notes are based on Chapters 7 of </a:t>
+            <p:ph sz="half" idx="1"/>
+          </p:nvPr>
+        </p:nvSpPr>
+        <p:spPr/>
+        <p:txBody>
+          <a:bodyPr/>
+          <a:lstStyle/>
+          <a:p>
+            <a:pPr lvl="0"/>
+            <a:r>
+              <a:t>These notes are based on Chapter 7 of </a:t>
             </a:r>
             <a:r>
               <a:rPr i="1">
@@ -4045,7 +5395,6 @@
               <a:t>Designing Machine Learning Systems</a:t>
             </a:r>
             <a:r>
-              <a:rPr/>
               <a:t>, by </a:t>
             </a:r>
             <a:r>
@@ -4055,44 +5404,155 @@
               <a:t>Chip Huyen</a:t>
             </a:r>
             <a:r>
-              <a:rPr/>
               <a:t>.</a:t>
             </a:r>
           </a:p>
         </p:txBody>
       </p:sp>
-      <p:pic>
-        <p:nvPicPr>
-          <p:cNvPr descr="../img/book_cover.png" id="0" name="Picture 1"/>
-          <p:cNvPicPr>
-            <a:picLocks noGrp="1" noChangeAspect="1"/>
-          </p:cNvPicPr>
-          <p:nvPr/>
-        </p:nvPicPr>
-        <p:blipFill>
-          <a:blip r:embed="rId4"/>
-          <a:stretch>
-            <a:fillRect/>
-          </a:stretch>
-        </p:blipFill>
-        <p:spPr bwMode="auto">
-          <a:xfrm>
-            <a:off x="6007100" y="2324100"/>
-            <a:ext cx="4660900" cy="3111500"/>
-          </a:xfrm>
-          <a:prstGeom prst="rect">
-            <a:avLst/>
-          </a:prstGeom>
-          <a:noFill/>
-          <a:ln w="9525">
-            <a:noFill/>
-            <a:headEnd/>
-            <a:tailEnd/>
-          </a:ln>
-        </p:spPr>
-      </p:pic>
+      <p:sp>
+        <p:nvSpPr>
+          <p:cNvPr id="4" name="Content Placeholder 3"/>
+          <p:cNvSpPr>
+            <a:spLocks noGrp="1"/>
+          </p:cNvSpPr>
+          <p:nvPr>
+            <p:ph sz="half" idx="2"/>
+          </p:nvPr>
+        </p:nvSpPr>
+        <p:spPr/>
+        <p:txBody>
+          <a:bodyPr>
+            <a:normAutofit/>
+          </a:bodyPr>
+          <a:lstStyle/>
+          <a:p>
+            <a:pPr marL="0" lvl="0" indent="0">
+              <a:buNone/>
+            </a:pPr>
+            <a:r>
+              <a:rPr sz="1100" b="1" dirty="0"/>
+              <a:t>Notebooks</a:t>
+            </a:r>
+          </a:p>
+          <a:p>
+            <a:pPr lvl="0"/>
+            <a:r>
+              <a:rPr sz="1100" dirty="0">
+                <a:latin typeface="Courier"/>
+              </a:rPr>
+              <a:t>./notebooks/production_5_model_development.ipynb</a:t>
+            </a:r>
+          </a:p>
+          <a:p>
+            <a:pPr marL="0" lvl="0" indent="0">
+              <a:buNone/>
+            </a:pPr>
+            <a:r>
+              <a:rPr sz="1100" b="1" dirty="0"/>
+              <a:t>Code</a:t>
+            </a:r>
+          </a:p>
+          <a:p>
+            <a:pPr lvl="0"/>
+            <a:r>
+              <a:rPr sz="1100" dirty="0">
+                <a:latin typeface="Courier"/>
+              </a:rPr>
+              <a:t>./src/credit_experiment_*.py</a:t>
+            </a:r>
+          </a:p>
+        </p:txBody>
+      </p:sp>
+      <p:sp>
+        <p:nvSpPr>
+          <p:cNvPr id="5" name="Date Placeholder 4">
+            <a:extLst>
+              <a:ext uri="{FF2B5EF4-FFF2-40B4-BE49-F238E27FC236}">
+                <a16:creationId xmlns:a16="http://schemas.microsoft.com/office/drawing/2014/main" id="{4039AD2E-FFF5-BC61-7F20-B24CA1813E5E}"/>
+              </a:ext>
+            </a:extLst>
+          </p:cNvPr>
+          <p:cNvSpPr>
+            <a:spLocks noGrp="1"/>
+          </p:cNvSpPr>
+          <p:nvPr>
+            <p:ph type="dt" sz="half" idx="10"/>
+          </p:nvPr>
+        </p:nvSpPr>
+        <p:spPr/>
+        <p:txBody>
+          <a:bodyPr/>
+          <a:lstStyle/>
+          <a:p>
+            <a:r>
+              <a:rPr lang="en-CA"/>
+              <a:t>March 2024</a:t>
+            </a:r>
+          </a:p>
+        </p:txBody>
+      </p:sp>
+      <p:sp>
+        <p:nvSpPr>
+          <p:cNvPr id="6" name="Footer Placeholder 5">
+            <a:extLst>
+              <a:ext uri="{FF2B5EF4-FFF2-40B4-BE49-F238E27FC236}">
+                <a16:creationId xmlns:a16="http://schemas.microsoft.com/office/drawing/2014/main" id="{2BA3422D-72F7-0955-34F2-F7239AA2D035}"/>
+              </a:ext>
+            </a:extLst>
+          </p:cNvPr>
+          <p:cNvSpPr>
+            <a:spLocks noGrp="1"/>
+          </p:cNvSpPr>
+          <p:nvPr>
+            <p:ph type="ftr" sz="quarter" idx="11"/>
+          </p:nvPr>
+        </p:nvSpPr>
+        <p:spPr/>
+        <p:txBody>
+          <a:bodyPr/>
+          <a:lstStyle/>
+          <a:p>
+            <a:r>
+              <a:rPr lang="en-CA"/>
+              <a:t>Production - Model Deployment</a:t>
+            </a:r>
+          </a:p>
+        </p:txBody>
+      </p:sp>
+      <p:sp>
+        <p:nvSpPr>
+          <p:cNvPr id="7" name="Slide Number Placeholder 6">
+            <a:extLst>
+              <a:ext uri="{FF2B5EF4-FFF2-40B4-BE49-F238E27FC236}">
+                <a16:creationId xmlns:a16="http://schemas.microsoft.com/office/drawing/2014/main" id="{33D98B0A-92AA-7C44-0996-D2F60894418F}"/>
+              </a:ext>
+            </a:extLst>
+          </p:cNvPr>
+          <p:cNvSpPr>
+            <a:spLocks noGrp="1"/>
+          </p:cNvSpPr>
+          <p:nvPr>
+            <p:ph type="sldNum" sz="quarter" idx="12"/>
+          </p:nvPr>
+        </p:nvSpPr>
+        <p:spPr/>
+        <p:txBody>
+          <a:bodyPr/>
+          <a:lstStyle/>
+          <a:p>
+            <a:fld id="{4F4BDF5D-830C-4829-B676-EE421164B1C8}" type="slidenum">
+              <a:rPr lang="en-CA" smtClean="0"/>
+              <a:t>4</a:t>
+            </a:fld>
+            <a:endParaRPr lang="en-CA"/>
+          </a:p>
+        </p:txBody>
+      </p:sp>
     </p:spTree>
   </p:cSld>
+  <p:clrMapOvr>
+    <a:masterClrMapping/>
+  </p:clrMapOvr>
 </p:sld>
 </file>
 
@@ -4123,83 +5583,115 @@
             <p:ph type="title"/>
           </p:nvPr>
         </p:nvSpPr>
-        <p:spPr/>
-        <p:txBody>
-          <a:bodyPr/>
-          <a:lstStyle/>
-          <a:p>
-            <a:pPr lvl="0" indent="0" marL="0">
-              <a:buNone/>
-            </a:pPr>
-            <a:r>
-              <a:rPr/>
-              <a:t>Reference Architecture</a:t>
-            </a:r>
-          </a:p>
-        </p:txBody>
-      </p:sp>
-      <p:pic>
-        <p:nvPicPr>
-          <p:cNvPr descr="../img/flock_ref_arhitecture.png" id="0" name="Picture 1"/>
-          <p:cNvPicPr>
-            <a:picLocks noGrp="1" noChangeAspect="1"/>
-          </p:cNvPicPr>
-          <p:nvPr/>
-        </p:nvPicPr>
-        <p:blipFill>
-          <a:blip r:embed="rId2"/>
-          <a:stretch>
-            <a:fillRect/>
-          </a:stretch>
-        </p:blipFill>
-        <p:spPr bwMode="auto">
-          <a:xfrm>
-            <a:off x="2679700" y="2006600"/>
-            <a:ext cx="6731000" cy="3251200"/>
-          </a:xfrm>
-          <a:prstGeom prst="rect">
-            <a:avLst/>
-          </a:prstGeom>
-          <a:noFill/>
-          <a:ln w="9525">
-            <a:noFill/>
-            <a:headEnd/>
-            <a:tailEnd/>
-          </a:ln>
-        </p:spPr>
-      </p:pic>
-      <p:sp>
-        <p:nvSpPr>
-          <p:cNvPr id="1" name="TextBox 3"/>
-          <p:cNvSpPr txBox="1"/>
-          <p:nvPr/>
-        </p:nvSpPr>
         <p:spPr>
           <a:xfrm>
-            <a:off x="673100" y="5257800"/>
-            <a:ext cx="10744200" cy="508000"/>
+            <a:off x="603504" y="767419"/>
+            <a:ext cx="10780776" cy="3355848"/>
           </a:xfrm>
-          <a:prstGeom prst="rect">
-            <a:avLst/>
-          </a:prstGeom>
-          <a:noFill/>
         </p:spPr>
         <p:txBody>
           <a:bodyPr/>
           <a:lstStyle/>
           <a:p>
-            <a:pPr lvl="0" indent="0" marL="0" algn="ctr">
+            <a:pPr marL="0" lvl="0" indent="0">
               <a:buNone/>
             </a:pPr>
             <a:r>
-              <a:rPr/>
-              <a:t>Aggrawal et al. (2020)</a:t>
-            </a:r>
+              <a:t>Our Reference Architecture</a:t>
+            </a:r>
+          </a:p>
+        </p:txBody>
+      </p:sp>
+      <p:sp>
+        <p:nvSpPr>
+          <p:cNvPr id="3" name="Date Placeholder 2">
+            <a:extLst>
+              <a:ext uri="{FF2B5EF4-FFF2-40B4-BE49-F238E27FC236}">
+                <a16:creationId xmlns:a16="http://schemas.microsoft.com/office/drawing/2014/main" id="{4C6B615C-4C36-A203-249C-6ABD9F92832F}"/>
+              </a:ext>
+            </a:extLst>
+          </p:cNvPr>
+          <p:cNvSpPr>
+            <a:spLocks noGrp="1"/>
+          </p:cNvSpPr>
+          <p:nvPr>
+            <p:ph type="dt" sz="half" idx="10"/>
+          </p:nvPr>
+        </p:nvSpPr>
+        <p:spPr/>
+        <p:txBody>
+          <a:bodyPr/>
+          <a:lstStyle/>
+          <a:p>
+            <a:r>
+              <a:rPr lang="en-CA"/>
+              <a:t>March 2024</a:t>
+            </a:r>
+          </a:p>
+        </p:txBody>
+      </p:sp>
+      <p:sp>
+        <p:nvSpPr>
+          <p:cNvPr id="4" name="Footer Placeholder 3">
+            <a:extLst>
+              <a:ext uri="{FF2B5EF4-FFF2-40B4-BE49-F238E27FC236}">
+                <a16:creationId xmlns:a16="http://schemas.microsoft.com/office/drawing/2014/main" id="{13677FE8-8FCF-94F1-3895-329DCBDC0AE2}"/>
+              </a:ext>
+            </a:extLst>
+          </p:cNvPr>
+          <p:cNvSpPr>
+            <a:spLocks noGrp="1"/>
+          </p:cNvSpPr>
+          <p:nvPr>
+            <p:ph type="ftr" sz="quarter" idx="11"/>
+          </p:nvPr>
+        </p:nvSpPr>
+        <p:spPr/>
+        <p:txBody>
+          <a:bodyPr/>
+          <a:lstStyle/>
+          <a:p>
+            <a:r>
+              <a:rPr lang="en-CA"/>
+              <a:t>Production - Model Deployment</a:t>
+            </a:r>
+          </a:p>
+        </p:txBody>
+      </p:sp>
+      <p:sp>
+        <p:nvSpPr>
+          <p:cNvPr id="5" name="Slide Number Placeholder 4">
+            <a:extLst>
+              <a:ext uri="{FF2B5EF4-FFF2-40B4-BE49-F238E27FC236}">
+                <a16:creationId xmlns:a16="http://schemas.microsoft.com/office/drawing/2014/main" id="{3D15A288-9678-5390-26B8-4100A6B5672F}"/>
+              </a:ext>
+            </a:extLst>
+          </p:cNvPr>
+          <p:cNvSpPr>
+            <a:spLocks noGrp="1"/>
+          </p:cNvSpPr>
+          <p:nvPr>
+            <p:ph type="sldNum" sz="quarter" idx="12"/>
+          </p:nvPr>
+        </p:nvSpPr>
+        <p:spPr/>
+        <p:txBody>
+          <a:bodyPr/>
+          <a:lstStyle/>
+          <a:p>
+            <a:fld id="{4F4BDF5D-830C-4829-B676-EE421164B1C8}" type="slidenum">
+              <a:rPr lang="en-CA" smtClean="0"/>
+              <a:t>5</a:t>
+            </a:fld>
+            <a:endParaRPr lang="en-CA"/>
           </a:p>
         </p:txBody>
       </p:sp>
     </p:spTree>
   </p:cSld>
+  <p:clrMapOvr>
+    <a:masterClrMapping/>
+  </p:clrMapOvr>
 </p:sld>
 </file>
 
@@ -4220,6 +5712,36 @@
           <a:chExt cx="0" cy="0"/>
         </a:xfrm>
       </p:grpSpPr>
+      <p:pic>
+        <p:nvPicPr>
+          <p:cNvPr id="3" name="Picture 1" descr="../img/flock_ref_arhitecture.png"/>
+          <p:cNvPicPr>
+            <a:picLocks noGrp="1" noChangeAspect="1"/>
+          </p:cNvPicPr>
+          <p:nvPr/>
+        </p:nvPicPr>
+        <p:blipFill>
+          <a:blip r:embed="rId2"/>
+          <a:stretch>
+            <a:fillRect/>
+          </a:stretch>
+        </p:blipFill>
+        <p:spPr bwMode="auto">
+          <a:xfrm>
+            <a:off x="1231900" y="1307285"/>
+            <a:ext cx="9626600" cy="4649830"/>
+          </a:xfrm>
+          <a:prstGeom prst="rect">
+            <a:avLst/>
+          </a:prstGeom>
+          <a:noFill/>
+          <a:ln w="9525">
+            <a:noFill/>
+            <a:headEnd/>
+            <a:tailEnd/>
+          </a:ln>
+        </p:spPr>
+      </p:pic>
       <p:sp>
         <p:nvSpPr>
           <p:cNvPr id="2" name="Title 1"/>
@@ -4235,78 +5757,191 @@
           <a:bodyPr/>
           <a:lstStyle/>
           <a:p>
-            <a:pPr lvl="0" indent="0" marL="0">
+            <a:pPr marL="0" lvl="0" indent="0">
               <a:buNone/>
             </a:pPr>
             <a:r>
-              <a:rPr/>
-              <a:t>Deployment</a:t>
-            </a:r>
-          </a:p>
-        </p:txBody>
-      </p:sp>
-      <p:sp>
-        <p:nvSpPr>
-          <p:cNvPr id="3" name="Content Placeholder 2"/>
-          <p:cNvSpPr>
-            <a:spLocks noGrp="1"/>
-          </p:cNvSpPr>
-          <p:nvPr>
-            <p:ph idx="1" sz="half"/>
-          </p:nvPr>
-        </p:nvSpPr>
-        <p:spPr/>
-        <p:txBody>
-          <a:bodyPr/>
-          <a:lstStyle/>
-          <a:p>
-            <a:pPr lvl="0"/>
-            <a:r>
-              <a:rPr/>
-              <a:t>Deploying a model is to make it useable by allowing users to interact with it through an app or by using its results for a purpose in a data product (BI visuals, reports, data views).</a:t>
-            </a:r>
-          </a:p>
-          <a:p>
-            <a:pPr lvl="0"/>
-            <a:r>
-              <a:rPr/>
-              <a:t>Deployment is a transition of development to production environment.</a:t>
-            </a:r>
-          </a:p>
-        </p:txBody>
-      </p:sp>
-      <p:sp>
-        <p:nvSpPr>
-          <p:cNvPr id="4" name="Content Placeholder 3"/>
-          <p:cNvSpPr>
-            <a:spLocks noGrp="1"/>
-          </p:cNvSpPr>
-          <p:nvPr>
-            <p:ph idx="2" sz="half"/>
-          </p:nvPr>
-        </p:nvSpPr>
-        <p:spPr/>
-        <p:txBody>
-          <a:bodyPr/>
-          <a:lstStyle/>
-          <a:p>
-            <a:pPr lvl="0"/>
-            <a:r>
-              <a:rPr/>
-              <a:t>There is a wide range of production environments: from BI to live applications serving millions of users.</a:t>
-            </a:r>
-          </a:p>
-          <a:p>
-            <a:pPr lvl="0"/>
-            <a:r>
-              <a:rPr/>
-              <a:t>Engaging with users in formal or informal feedback conversations is useful, although not always possible.</a:t>
-            </a:r>
+              <a:t>The Flock Reference Architecture</a:t>
+            </a:r>
+          </a:p>
+        </p:txBody>
+      </p:sp>
+      <p:sp>
+        <p:nvSpPr>
+          <p:cNvPr id="4" name="TextBox 3"/>
+          <p:cNvSpPr txBox="1"/>
+          <p:nvPr/>
+        </p:nvSpPr>
+        <p:spPr>
+          <a:xfrm>
+            <a:off x="673100" y="6143625"/>
+            <a:ext cx="10744200" cy="508000"/>
+          </a:xfrm>
+          <a:prstGeom prst="rect">
+            <a:avLst/>
+          </a:prstGeom>
+          <a:noFill/>
+        </p:spPr>
+        <p:txBody>
+          <a:bodyPr/>
+          <a:lstStyle/>
+          <a:p>
+            <a:pPr marL="0" lvl="0" indent="0" algn="ctr">
+              <a:buNone/>
+            </a:pPr>
+            <a:r>
+              <a:rPr sz="1100" dirty="0"/>
+              <a:t>Agrawal et al (2019)</a:t>
+            </a:r>
+          </a:p>
+        </p:txBody>
+      </p:sp>
+      <p:sp>
+        <p:nvSpPr>
+          <p:cNvPr id="5" name="Date Placeholder 4">
+            <a:extLst>
+              <a:ext uri="{FF2B5EF4-FFF2-40B4-BE49-F238E27FC236}">
+                <a16:creationId xmlns:a16="http://schemas.microsoft.com/office/drawing/2014/main" id="{1CE022BB-6FEF-1FE4-B510-0029E87F0144}"/>
+              </a:ext>
+            </a:extLst>
+          </p:cNvPr>
+          <p:cNvSpPr>
+            <a:spLocks noGrp="1"/>
+          </p:cNvSpPr>
+          <p:nvPr>
+            <p:ph type="dt" sz="half" idx="10"/>
+          </p:nvPr>
+        </p:nvSpPr>
+        <p:spPr/>
+        <p:txBody>
+          <a:bodyPr/>
+          <a:lstStyle/>
+          <a:p>
+            <a:r>
+              <a:rPr lang="en-CA"/>
+              <a:t>March 2024</a:t>
+            </a:r>
+          </a:p>
+        </p:txBody>
+      </p:sp>
+      <p:sp>
+        <p:nvSpPr>
+          <p:cNvPr id="6" name="Footer Placeholder 5">
+            <a:extLst>
+              <a:ext uri="{FF2B5EF4-FFF2-40B4-BE49-F238E27FC236}">
+                <a16:creationId xmlns:a16="http://schemas.microsoft.com/office/drawing/2014/main" id="{81543C63-2677-22AA-7008-BB6D0D7D5FB2}"/>
+              </a:ext>
+            </a:extLst>
+          </p:cNvPr>
+          <p:cNvSpPr>
+            <a:spLocks noGrp="1"/>
+          </p:cNvSpPr>
+          <p:nvPr>
+            <p:ph type="ftr" sz="quarter" idx="11"/>
+          </p:nvPr>
+        </p:nvSpPr>
+        <p:spPr/>
+        <p:txBody>
+          <a:bodyPr/>
+          <a:lstStyle/>
+          <a:p>
+            <a:r>
+              <a:rPr lang="en-CA"/>
+              <a:t>Production - Model Deployment</a:t>
+            </a:r>
+          </a:p>
+        </p:txBody>
+      </p:sp>
+      <p:sp>
+        <p:nvSpPr>
+          <p:cNvPr id="7" name="Slide Number Placeholder 6">
+            <a:extLst>
+              <a:ext uri="{FF2B5EF4-FFF2-40B4-BE49-F238E27FC236}">
+                <a16:creationId xmlns:a16="http://schemas.microsoft.com/office/drawing/2014/main" id="{4CCA4D5F-8BFD-30EF-D619-9B995D627B44}"/>
+              </a:ext>
+            </a:extLst>
+          </p:cNvPr>
+          <p:cNvSpPr>
+            <a:spLocks noGrp="1"/>
+          </p:cNvSpPr>
+          <p:nvPr>
+            <p:ph type="sldNum" sz="quarter" idx="12"/>
+          </p:nvPr>
+        </p:nvSpPr>
+        <p:spPr/>
+        <p:txBody>
+          <a:bodyPr/>
+          <a:lstStyle/>
+          <a:p>
+            <a:fld id="{4F4BDF5D-830C-4829-B676-EE421164B1C8}" type="slidenum">
+              <a:rPr lang="en-CA" smtClean="0"/>
+              <a:t>6</a:t>
+            </a:fld>
+            <a:endParaRPr lang="en-CA"/>
+          </a:p>
+        </p:txBody>
+      </p:sp>
+      <p:sp>
+        <p:nvSpPr>
+          <p:cNvPr id="8" name="Rectangle: Rounded Corners 7">
+            <a:extLst>
+              <a:ext uri="{FF2B5EF4-FFF2-40B4-BE49-F238E27FC236}">
+                <a16:creationId xmlns:a16="http://schemas.microsoft.com/office/drawing/2014/main" id="{91AD2CE6-3392-53E5-03E1-9375904BC9F0}"/>
+              </a:ext>
+            </a:extLst>
+          </p:cNvPr>
+          <p:cNvSpPr/>
+          <p:nvPr/>
+        </p:nvSpPr>
+        <p:spPr>
+          <a:xfrm>
+            <a:off x="3771900" y="3427947"/>
+            <a:ext cx="4333875" cy="1990725"/>
+          </a:xfrm>
+          <a:prstGeom prst="roundRect">
+            <a:avLst/>
+          </a:prstGeom>
+          <a:solidFill>
+            <a:srgbClr val="FFC000">
+              <a:alpha val="25098"/>
+            </a:srgbClr>
+          </a:solidFill>
+          <a:ln w="57150">
+            <a:solidFill>
+              <a:srgbClr val="FF0000"/>
+            </a:solidFill>
+          </a:ln>
+        </p:spPr>
+        <p:style>
+          <a:lnRef idx="2">
+            <a:schemeClr val="accent1">
+              <a:shade val="15000"/>
+            </a:schemeClr>
+          </a:lnRef>
+          <a:fillRef idx="1">
+            <a:schemeClr val="accent1"/>
+          </a:fillRef>
+          <a:effectRef idx="0">
+            <a:schemeClr val="accent1"/>
+          </a:effectRef>
+          <a:fontRef idx="minor">
+            <a:schemeClr val="lt1"/>
+          </a:fontRef>
+        </p:style>
+        <p:txBody>
+          <a:bodyPr rtlCol="0" anchor="ctr"/>
+          <a:lstStyle/>
+          <a:p>
+            <a:pPr algn="ctr"/>
+            <a:endParaRPr lang="en-CA"/>
           </a:p>
         </p:txBody>
       </p:sp>
     </p:spTree>
   </p:cSld>
+  <p:clrMapOvr>
+    <a:masterClrMapping/>
+  </p:clrMapOvr>
 </p:sld>
 </file>
 
@@ -4337,122 +5972,115 @@
             <p:ph type="title"/>
           </p:nvPr>
         </p:nvSpPr>
-        <p:spPr/>
-        <p:txBody>
-          <a:bodyPr/>
-          <a:lstStyle/>
-          <a:p>
-            <a:pPr lvl="0" indent="0" marL="0">
+        <p:spPr>
+          <a:xfrm>
+            <a:off x="603504" y="767419"/>
+            <a:ext cx="10780776" cy="3355848"/>
+          </a:xfrm>
+        </p:spPr>
+        <p:txBody>
+          <a:bodyPr/>
+          <a:lstStyle/>
+          <a:p>
+            <a:pPr marL="0" lvl="0" indent="0">
               <a:buNone/>
             </a:pPr>
             <a:r>
-              <a:rPr/>
-              <a:t>Deployment Myths and Anti-Patterns</a:t>
-            </a:r>
-          </a:p>
-        </p:txBody>
-      </p:sp>
-      <p:sp>
-        <p:nvSpPr>
-          <p:cNvPr id="3" name="Content Placeholder 2"/>
-          <p:cNvSpPr>
-            <a:spLocks noGrp="1"/>
-          </p:cNvSpPr>
-          <p:nvPr>
-            <p:ph idx="1" sz="half"/>
-          </p:nvPr>
-        </p:nvSpPr>
-        <p:spPr/>
-        <p:txBody>
-          <a:bodyPr/>
-          <a:lstStyle/>
-          <a:p>
-            <a:pPr lvl="0" indent="0" marL="0">
-              <a:buNone/>
-            </a:pPr>
-            <a:r>
-              <a:rPr b="1"/>
-              <a:t>1. You only deploy one or two ML models at a time</a:t>
-            </a:r>
-          </a:p>
-          <a:p>
-            <a:pPr lvl="0"/>
-            <a:r>
-              <a:rPr/>
-              <a:t>Infrastructure should support many models, not only a few.</a:t>
-            </a:r>
-          </a:p>
-          <a:p>
-            <a:pPr lvl="0"/>
-            <a:r>
-              <a:rPr/>
-              <a:t>Many models can interact and we also need a way of mapping these interactions.</a:t>
-            </a:r>
-          </a:p>
-          <a:p>
-            <a:pPr lvl="0"/>
-            <a:r>
-              <a:rPr/>
-              <a:t>Ride sharing app:</a:t>
-            </a:r>
-          </a:p>
-          <a:p>
-            <a:pPr lvl="1"/>
-            <a:r>
-              <a:rPr/>
-              <a:t>10 models: ride demand, driver availability, estimated time of arrival dynamic pricing, fraud, churn, etc.</a:t>
-            </a:r>
-          </a:p>
-          <a:p>
-            <a:pPr lvl="1"/>
-            <a:r>
-              <a:rPr/>
-              <a:t>20 countries.</a:t>
-            </a:r>
-          </a:p>
-        </p:txBody>
-      </p:sp>
-      <p:sp>
-        <p:nvSpPr>
-          <p:cNvPr id="4" name="Content Placeholder 3"/>
-          <p:cNvSpPr>
-            <a:spLocks noGrp="1"/>
-          </p:cNvSpPr>
-          <p:nvPr>
-            <p:ph idx="2" sz="half"/>
-          </p:nvPr>
-        </p:nvSpPr>
-        <p:spPr/>
-        <p:txBody>
-          <a:bodyPr/>
-          <a:lstStyle/>
-          <a:p>
-            <a:pPr lvl="0" indent="0" marL="0">
-              <a:buNone/>
-            </a:pPr>
-            <a:r>
-              <a:rPr b="1"/>
-              <a:t>2. If we don’t do anything, mode performance stays the same</a:t>
-            </a:r>
-          </a:p>
-          <a:p>
-            <a:pPr lvl="0"/>
-            <a:r>
-              <a:rPr/>
-              <a:t>Software does not age like fine wine.</a:t>
-            </a:r>
-          </a:p>
-          <a:p>
-            <a:pPr lvl="0"/>
-            <a:r>
-              <a:rPr/>
-              <a:t>Data distribution shifts: when the data distribution that the trained model is different from the one during training.</a:t>
-            </a:r>
+              <a:t>Deployment</a:t>
+            </a:r>
+          </a:p>
+        </p:txBody>
+      </p:sp>
+      <p:sp>
+        <p:nvSpPr>
+          <p:cNvPr id="3" name="Date Placeholder 2">
+            <a:extLst>
+              <a:ext uri="{FF2B5EF4-FFF2-40B4-BE49-F238E27FC236}">
+                <a16:creationId xmlns:a16="http://schemas.microsoft.com/office/drawing/2014/main" id="{B052ACAD-1CBC-F388-EBCF-81B08C344ED5}"/>
+              </a:ext>
+            </a:extLst>
+          </p:cNvPr>
+          <p:cNvSpPr>
+            <a:spLocks noGrp="1"/>
+          </p:cNvSpPr>
+          <p:nvPr>
+            <p:ph type="dt" sz="half" idx="10"/>
+          </p:nvPr>
+        </p:nvSpPr>
+        <p:spPr/>
+        <p:txBody>
+          <a:bodyPr/>
+          <a:lstStyle/>
+          <a:p>
+            <a:r>
+              <a:rPr lang="en-CA"/>
+              <a:t>March 2024</a:t>
+            </a:r>
+          </a:p>
+        </p:txBody>
+      </p:sp>
+      <p:sp>
+        <p:nvSpPr>
+          <p:cNvPr id="4" name="Footer Placeholder 3">
+            <a:extLst>
+              <a:ext uri="{FF2B5EF4-FFF2-40B4-BE49-F238E27FC236}">
+                <a16:creationId xmlns:a16="http://schemas.microsoft.com/office/drawing/2014/main" id="{9E6A27CE-4A9E-D05A-D74E-B55AE1CDF0F1}"/>
+              </a:ext>
+            </a:extLst>
+          </p:cNvPr>
+          <p:cNvSpPr>
+            <a:spLocks noGrp="1"/>
+          </p:cNvSpPr>
+          <p:nvPr>
+            <p:ph type="ftr" sz="quarter" idx="11"/>
+          </p:nvPr>
+        </p:nvSpPr>
+        <p:spPr/>
+        <p:txBody>
+          <a:bodyPr/>
+          <a:lstStyle/>
+          <a:p>
+            <a:r>
+              <a:rPr lang="en-CA"/>
+              <a:t>Production - Model Deployment</a:t>
+            </a:r>
+          </a:p>
+        </p:txBody>
+      </p:sp>
+      <p:sp>
+        <p:nvSpPr>
+          <p:cNvPr id="5" name="Slide Number Placeholder 4">
+            <a:extLst>
+              <a:ext uri="{FF2B5EF4-FFF2-40B4-BE49-F238E27FC236}">
+                <a16:creationId xmlns:a16="http://schemas.microsoft.com/office/drawing/2014/main" id="{2F6D7AFC-4636-1950-87E4-F2CAC10C5262}"/>
+              </a:ext>
+            </a:extLst>
+          </p:cNvPr>
+          <p:cNvSpPr>
+            <a:spLocks noGrp="1"/>
+          </p:cNvSpPr>
+          <p:nvPr>
+            <p:ph type="sldNum" sz="quarter" idx="12"/>
+          </p:nvPr>
+        </p:nvSpPr>
+        <p:spPr/>
+        <p:txBody>
+          <a:bodyPr/>
+          <a:lstStyle/>
+          <a:p>
+            <a:fld id="{4F4BDF5D-830C-4829-B676-EE421164B1C8}" type="slidenum">
+              <a:rPr lang="en-CA" smtClean="0"/>
+              <a:t>7</a:t>
+            </a:fld>
+            <a:endParaRPr lang="en-CA"/>
           </a:p>
         </p:txBody>
       </p:sp>
     </p:spTree>
   </p:cSld>
+  <p:clrMapOvr>
+    <a:masterClrMapping/>
+  </p:clrMapOvr>
 </p:sld>
 </file>
 
@@ -4488,12 +6116,11 @@
           <a:bodyPr/>
           <a:lstStyle/>
           <a:p>
-            <a:pPr lvl="0" indent="0" marL="0">
+            <a:pPr marL="0" lvl="0" indent="0">
               <a:buNone/>
             </a:pPr>
             <a:r>
-              <a:rPr/>
-              <a:t>Deployment Myths and Anti-Patterns (cont.)</a:t>
+              <a:t>Deployment</a:t>
             </a:r>
           </a:p>
         </p:txBody>
@@ -4505,55 +6132,25 @@
             <a:spLocks noGrp="1"/>
           </p:cNvSpPr>
           <p:nvPr>
-            <p:ph idx="1" sz="half"/>
-          </p:nvPr>
-        </p:nvSpPr>
-        <p:spPr/>
-        <p:txBody>
-          <a:bodyPr/>
-          <a:lstStyle/>
-          <a:p>
-            <a:pPr lvl="0" indent="0" marL="0">
-              <a:buNone/>
-            </a:pPr>
-            <a:r>
-              <a:rPr b="1"/>
-              <a:t>3. You won’t need to update your models as much</a:t>
-            </a:r>
-          </a:p>
+            <p:ph sz="half" idx="1"/>
+          </p:nvPr>
+        </p:nvSpPr>
+        <p:spPr/>
+        <p:txBody>
+          <a:bodyPr>
+            <a:normAutofit lnSpcReduction="10000"/>
+          </a:bodyPr>
+          <a:lstStyle/>
           <a:p>
             <a:pPr lvl="0"/>
             <a:r>
-              <a:rPr/>
-              <a:t>Model performance decays over time.</a:t>
+              <a:t>Deploying a model is to make it useable by allowing users to interact with it through an app or by using its results for a purpose in a data product (BI visuals, reports, data views).</a:t>
             </a:r>
           </a:p>
           <a:p>
             <a:pPr lvl="0"/>
             <a:r>
-              <a:rPr/>
-              <a:t>Deploy should be easy:</a:t>
-            </a:r>
-          </a:p>
-          <a:p>
-            <a:pPr lvl="1"/>
-            <a:r>
-              <a:rPr/>
-              <a:t>Development environment should resemble as close as possible the production environment.</a:t>
-            </a:r>
-          </a:p>
-          <a:p>
-            <a:pPr lvl="1"/>
-            <a:r>
-              <a:rPr/>
-              <a:t>Infrastructure should be easier to rebuild than to repair.</a:t>
-            </a:r>
-          </a:p>
-          <a:p>
-            <a:pPr lvl="1"/>
-            <a:r>
-              <a:rPr/>
-              <a:t>Small incremental and frequent changes.</a:t>
+              <a:t>Deployment is a transition of development to a production environment.</a:t>
             </a:r>
           </a:p>
         </p:txBody>
@@ -4565,40 +6162,119 @@
             <a:spLocks noGrp="1"/>
           </p:cNvSpPr>
           <p:nvPr>
-            <p:ph idx="2" sz="half"/>
-          </p:nvPr>
-        </p:nvSpPr>
-        <p:spPr/>
-        <p:txBody>
-          <a:bodyPr/>
-          <a:lstStyle/>
-          <a:p>
-            <a:pPr lvl="0" indent="0" marL="0">
-              <a:buNone/>
-            </a:pPr>
-            <a:r>
-              <a:rPr b="1"/>
-              <a:t>4. Most ML engineers don’t need to worry about scale</a:t>
-            </a:r>
-          </a:p>
+            <p:ph sz="half" idx="2"/>
+          </p:nvPr>
+        </p:nvSpPr>
+        <p:spPr/>
+        <p:txBody>
+          <a:bodyPr>
+            <a:normAutofit lnSpcReduction="10000"/>
+          </a:bodyPr>
+          <a:lstStyle/>
           <a:p>
             <a:pPr lvl="0"/>
             <a:r>
-              <a:rPr/>
-              <a:t>Scale means different things to different applications.</a:t>
+              <a:t>There is a wide range of production environments, from BI to live applications serving millions of users.</a:t>
             </a:r>
           </a:p>
           <a:p>
             <a:pPr lvl="0"/>
             <a:r>
-              <a:rPr/>
-              <a:t>Number of users, availability, speed or volume of data.</a:t>
-            </a:r>
+              <a:t>Engaging with users in formal or informal feedback conversations is helpful, although only sometimes possible.</a:t>
+            </a:r>
+          </a:p>
+        </p:txBody>
+      </p:sp>
+      <p:sp>
+        <p:nvSpPr>
+          <p:cNvPr id="5" name="Date Placeholder 4">
+            <a:extLst>
+              <a:ext uri="{FF2B5EF4-FFF2-40B4-BE49-F238E27FC236}">
+                <a16:creationId xmlns:a16="http://schemas.microsoft.com/office/drawing/2014/main" id="{36AE5D2B-14F8-8B26-571B-AA35C6803533}"/>
+              </a:ext>
+            </a:extLst>
+          </p:cNvPr>
+          <p:cNvSpPr>
+            <a:spLocks noGrp="1"/>
+          </p:cNvSpPr>
+          <p:nvPr>
+            <p:ph type="dt" sz="half" idx="10"/>
+          </p:nvPr>
+        </p:nvSpPr>
+        <p:spPr/>
+        <p:txBody>
+          <a:bodyPr/>
+          <a:lstStyle/>
+          <a:p>
+            <a:r>
+              <a:rPr lang="en-CA"/>
+              <a:t>March 2024</a:t>
+            </a:r>
+          </a:p>
+        </p:txBody>
+      </p:sp>
+      <p:sp>
+        <p:nvSpPr>
+          <p:cNvPr id="6" name="Footer Placeholder 5">
+            <a:extLst>
+              <a:ext uri="{FF2B5EF4-FFF2-40B4-BE49-F238E27FC236}">
+                <a16:creationId xmlns:a16="http://schemas.microsoft.com/office/drawing/2014/main" id="{F19C515E-7571-4F36-8621-BAF53AC23501}"/>
+              </a:ext>
+            </a:extLst>
+          </p:cNvPr>
+          <p:cNvSpPr>
+            <a:spLocks noGrp="1"/>
+          </p:cNvSpPr>
+          <p:nvPr>
+            <p:ph type="ftr" sz="quarter" idx="11"/>
+          </p:nvPr>
+        </p:nvSpPr>
+        <p:spPr/>
+        <p:txBody>
+          <a:bodyPr/>
+          <a:lstStyle/>
+          <a:p>
+            <a:r>
+              <a:rPr lang="en-CA"/>
+              <a:t>Production - Model Deployment</a:t>
+            </a:r>
+          </a:p>
+        </p:txBody>
+      </p:sp>
+      <p:sp>
+        <p:nvSpPr>
+          <p:cNvPr id="7" name="Slide Number Placeholder 6">
+            <a:extLst>
+              <a:ext uri="{FF2B5EF4-FFF2-40B4-BE49-F238E27FC236}">
+                <a16:creationId xmlns:a16="http://schemas.microsoft.com/office/drawing/2014/main" id="{C57928DC-8FB8-67AA-2BD8-B1E4BD0FC3CD}"/>
+              </a:ext>
+            </a:extLst>
+          </p:cNvPr>
+          <p:cNvSpPr>
+            <a:spLocks noGrp="1"/>
+          </p:cNvSpPr>
+          <p:nvPr>
+            <p:ph type="sldNum" sz="quarter" idx="12"/>
+          </p:nvPr>
+        </p:nvSpPr>
+        <p:spPr/>
+        <p:txBody>
+          <a:bodyPr/>
+          <a:lstStyle/>
+          <a:p>
+            <a:fld id="{4F4BDF5D-830C-4829-B676-EE421164B1C8}" type="slidenum">
+              <a:rPr lang="en-CA" smtClean="0"/>
+              <a:t>8</a:t>
+            </a:fld>
+            <a:endParaRPr lang="en-CA"/>
           </a:p>
         </p:txBody>
       </p:sp>
     </p:spTree>
   </p:cSld>
+  <p:clrMapOvr>
+    <a:masterClrMapping/>
+  </p:clrMapOvr>
 </p:sld>
 </file>
 
@@ -4634,12 +6310,11 @@
           <a:bodyPr/>
           <a:lstStyle/>
           <a:p>
-            <a:pPr lvl="0" indent="0" marL="0">
+            <a:pPr marL="0" lvl="0" indent="0">
               <a:buNone/>
             </a:pPr>
             <a:r>
-              <a:rPr/>
-              <a:t>Batch Prediction Vs Online Prediction</a:t>
+              <a:t>Deployment Myths and Anti-Patterns</a:t>
             </a:r>
           </a:p>
         </p:txBody>
@@ -4651,108 +6326,185 @@
             <a:spLocks noGrp="1"/>
           </p:cNvSpPr>
           <p:nvPr>
-            <p:ph idx="1" sz="half"/>
-          </p:nvPr>
-        </p:nvSpPr>
-        <p:spPr/>
-        <p:txBody>
-          <a:bodyPr/>
-          <a:lstStyle/>
-          <a:p>
-            <a:pPr lvl="0" indent="0" marL="0">
+            <p:ph sz="half" idx="1"/>
+          </p:nvPr>
+        </p:nvSpPr>
+        <p:spPr/>
+        <p:txBody>
+          <a:bodyPr>
+            <a:normAutofit fontScale="77500" lnSpcReduction="20000"/>
+          </a:bodyPr>
+          <a:lstStyle/>
+          <a:p>
+            <a:pPr marL="0" lvl="0" indent="0">
               <a:buNone/>
             </a:pPr>
             <a:r>
               <a:rPr b="1"/>
-              <a:t>Online Prediction</a:t>
+              <a:t>1. You only deploy one or two ML models at a time</a:t>
             </a:r>
           </a:p>
           <a:p>
             <a:pPr lvl="0"/>
             <a:r>
-              <a:rPr/>
-              <a:t>Predictions are generated and returned as soon as requests for these predictions arrive.</a:t>
+              <a:t>Infrastructure should support many models, not only a few.</a:t>
             </a:r>
           </a:p>
           <a:p>
             <a:pPr lvl="0"/>
             <a:r>
-              <a:rPr/>
-              <a:t>Also known as on-demand prediction.</a:t>
+              <a:t>Many models can interact, and we also need a way of mapping these interactions.</a:t>
             </a:r>
           </a:p>
           <a:p>
             <a:pPr lvl="0"/>
             <a:r>
-              <a:rPr/>
-              <a:t>Traditionally, requests are made to a prediction service via a RESTful API.</a:t>
+              <a:t>Ride sharing app:</a:t>
+            </a:r>
+          </a:p>
+          <a:p>
+            <a:pPr lvl="1"/>
+            <a:r>
+              <a:t>10 models: ride demand, driver availability, estimated time of arrival, dynamic pricing, fraud, churn, etc.</a:t>
+            </a:r>
+          </a:p>
+          <a:p>
+            <a:pPr lvl="1"/>
+            <a:r>
+              <a:t>20 countries.</a:t>
+            </a:r>
+          </a:p>
+        </p:txBody>
+      </p:sp>
+      <p:sp>
+        <p:nvSpPr>
+          <p:cNvPr id="4" name="Content Placeholder 3"/>
+          <p:cNvSpPr>
+            <a:spLocks noGrp="1"/>
+          </p:cNvSpPr>
+          <p:nvPr>
+            <p:ph sz="half" idx="2"/>
+          </p:nvPr>
+        </p:nvSpPr>
+        <p:spPr/>
+        <p:txBody>
+          <a:bodyPr>
+            <a:normAutofit fontScale="77500" lnSpcReduction="20000"/>
+          </a:bodyPr>
+          <a:lstStyle/>
+          <a:p>
+            <a:pPr marL="0" lvl="0" indent="0">
+              <a:buNone/>
+            </a:pPr>
+            <a:r>
+              <a:rPr b="1"/>
+              <a:t>2. If we don’t do anything, model performance stays the same</a:t>
             </a:r>
           </a:p>
           <a:p>
             <a:pPr lvl="0"/>
             <a:r>
-              <a:rPr/>
-              <a:t>When requests are made via HTTP, online prediction is known as </a:t>
-            </a:r>
-            <a:r>
-              <a:rPr i="1"/>
-              <a:t>synchronous prediction</a:t>
-            </a:r>
-            <a:r>
-              <a:rPr/>
-              <a:t>.</a:t>
-            </a:r>
-          </a:p>
-        </p:txBody>
-      </p:sp>
-      <p:sp>
-        <p:nvSpPr>
-          <p:cNvPr id="4" name="Content Placeholder 3"/>
-          <p:cNvSpPr>
-            <a:spLocks noGrp="1"/>
-          </p:cNvSpPr>
-          <p:nvPr>
-            <p:ph idx="2" sz="half"/>
-          </p:nvPr>
-        </p:nvSpPr>
-        <p:spPr/>
-        <p:txBody>
-          <a:bodyPr/>
-          <a:lstStyle/>
-          <a:p>
-            <a:pPr lvl="0" indent="0" marL="0">
-              <a:buNone/>
-            </a:pPr>
-            <a:r>
-              <a:rPr b="1"/>
-              <a:t>Batch Prediction</a:t>
+              <a:t>Software does not age like fine wine.</a:t>
             </a:r>
           </a:p>
           <a:p>
             <a:pPr lvl="0"/>
             <a:r>
-              <a:rPr/>
-              <a:t>Predictions are generated preiodically or whenever triggered.</a:t>
-            </a:r>
-          </a:p>
-          <a:p>
-            <a:pPr lvl="0"/>
-            <a:r>
-              <a:rPr/>
-              <a:t>Predictions are stored in SQL tables or in memory. They are later retrieved as needed.</a:t>
-            </a:r>
-          </a:p>
-          <a:p>
-            <a:pPr lvl="0"/>
-            <a:r>
-              <a:rPr/>
-              <a:t>Batch prediction is also known as asynchronous prediction.</a:t>
-            </a:r>
+              <a:t>Data distribution shifts: when the data distribution in the trained model differs from the distribution during testing.</a:t>
+            </a:r>
+          </a:p>
+        </p:txBody>
+      </p:sp>
+      <p:sp>
+        <p:nvSpPr>
+          <p:cNvPr id="5" name="Date Placeholder 4">
+            <a:extLst>
+              <a:ext uri="{FF2B5EF4-FFF2-40B4-BE49-F238E27FC236}">
+                <a16:creationId xmlns:a16="http://schemas.microsoft.com/office/drawing/2014/main" id="{B4638DD1-9249-A4CF-076C-8FA9CCDE6E14}"/>
+              </a:ext>
+            </a:extLst>
+          </p:cNvPr>
+          <p:cNvSpPr>
+            <a:spLocks noGrp="1"/>
+          </p:cNvSpPr>
+          <p:nvPr>
+            <p:ph type="dt" sz="half" idx="10"/>
+          </p:nvPr>
+        </p:nvSpPr>
+        <p:spPr/>
+        <p:txBody>
+          <a:bodyPr/>
+          <a:lstStyle/>
+          <a:p>
+            <a:r>
+              <a:rPr lang="en-CA"/>
+              <a:t>March 2024</a:t>
+            </a:r>
+          </a:p>
+        </p:txBody>
+      </p:sp>
+      <p:sp>
+        <p:nvSpPr>
+          <p:cNvPr id="6" name="Footer Placeholder 5">
+            <a:extLst>
+              <a:ext uri="{FF2B5EF4-FFF2-40B4-BE49-F238E27FC236}">
+                <a16:creationId xmlns:a16="http://schemas.microsoft.com/office/drawing/2014/main" id="{BB57C577-A795-C4DB-0B47-A746210EF217}"/>
+              </a:ext>
+            </a:extLst>
+          </p:cNvPr>
+          <p:cNvSpPr>
+            <a:spLocks noGrp="1"/>
+          </p:cNvSpPr>
+          <p:nvPr>
+            <p:ph type="ftr" sz="quarter" idx="11"/>
+          </p:nvPr>
+        </p:nvSpPr>
+        <p:spPr/>
+        <p:txBody>
+          <a:bodyPr/>
+          <a:lstStyle/>
+          <a:p>
+            <a:r>
+              <a:rPr lang="en-CA"/>
+              <a:t>Production - Model Deployment</a:t>
+            </a:r>
+          </a:p>
+        </p:txBody>
+      </p:sp>
+      <p:sp>
+        <p:nvSpPr>
+          <p:cNvPr id="7" name="Slide Number Placeholder 6">
+            <a:extLst>
+              <a:ext uri="{FF2B5EF4-FFF2-40B4-BE49-F238E27FC236}">
+                <a16:creationId xmlns:a16="http://schemas.microsoft.com/office/drawing/2014/main" id="{8359E46C-2206-67DC-4E4A-4CC3B4D87DF4}"/>
+              </a:ext>
+            </a:extLst>
+          </p:cNvPr>
+          <p:cNvSpPr>
+            <a:spLocks noGrp="1"/>
+          </p:cNvSpPr>
+          <p:nvPr>
+            <p:ph type="sldNum" sz="quarter" idx="12"/>
+          </p:nvPr>
+        </p:nvSpPr>
+        <p:spPr/>
+        <p:txBody>
+          <a:bodyPr/>
+          <a:lstStyle/>
+          <a:p>
+            <a:fld id="{4F4BDF5D-830C-4829-B676-EE421164B1C8}" type="slidenum">
+              <a:rPr lang="en-CA" smtClean="0"/>
+              <a:t>9</a:t>
+            </a:fld>
+            <a:endParaRPr lang="en-CA"/>
           </a:p>
         </p:txBody>
       </p:sp>
     </p:spTree>
   </p:cSld>
+  <p:clrMapOvr>
+    <a:masterClrMapping/>
+  </p:clrMapOvr>
 </p:sld>
 </file>
 
@@ -5010,7 +6762,7 @@
         <a:srgbClr val="E7E6E6"/>
       </a:lt2>
       <a:accent1>
-        <a:srgbClr val="5B9BD5"/>
+        <a:srgbClr val="4472C4"/>
       </a:accent1>
       <a:accent2>
         <a:srgbClr val="ED7D31"/>
@@ -5022,7 +6774,7 @@
         <a:srgbClr val="FFC000"/>
       </a:accent4>
       <a:accent5>
-        <a:srgbClr val="4472C4"/>
+        <a:srgbClr val="5B9BD5"/>
       </a:accent5>
       <a:accent6>
         <a:srgbClr val="70AD47"/>
@@ -5039,9 +6791,9 @@
         <a:latin typeface="Calibri Light" panose="020F0302020204030204"/>
         <a:ea typeface=""/>
         <a:cs typeface=""/>
-        <a:font script="Jpan" typeface="ＭＳ Ｐゴシック"/>
+        <a:font script="Jpan" typeface="游ゴシック Light"/>
         <a:font script="Hang" typeface="맑은 고딕"/>
-        <a:font script="Hans" typeface="宋体"/>
+        <a:font script="Hans" typeface="等线 Light"/>
         <a:font script="Hant" typeface="新細明體"/>
         <a:font script="Arab" typeface="Times New Roman"/>
         <a:font script="Hebr" typeface="Times New Roman"/>
@@ -5069,14 +6821,31 @@
         <a:font script="Viet" typeface="Times New Roman"/>
         <a:font script="Uigh" typeface="Microsoft Uighur"/>
         <a:font script="Geor" typeface="Sylfaen"/>
+        <a:font script="Armn" typeface="Arial"/>
+        <a:font script="Bugi" typeface="Leelawadee UI"/>
+        <a:font script="Bopo" typeface="Microsoft JhengHei"/>
+        <a:font script="Java" typeface="Javanese Text"/>
+        <a:font script="Lisu" typeface="Segoe UI"/>
+        <a:font script="Mymr" typeface="Myanmar Text"/>
+        <a:font script="Nkoo" typeface="Ebrima"/>
+        <a:font script="Olck" typeface="Nirmala UI"/>
+        <a:font script="Osma" typeface="Ebrima"/>
+        <a:font script="Phag" typeface="Phagspa"/>
+        <a:font script="Syrn" typeface="Estrangelo Edessa"/>
+        <a:font script="Syrj" typeface="Estrangelo Edessa"/>
+        <a:font script="Syre" typeface="Estrangelo Edessa"/>
+        <a:font script="Sora" typeface="Nirmala UI"/>
+        <a:font script="Tale" typeface="Microsoft Tai Le"/>
+        <a:font script="Talu" typeface="Microsoft New Tai Lue"/>
+        <a:font script="Tfng" typeface="Ebrima"/>
       </a:majorFont>
       <a:minorFont>
         <a:latin typeface="Calibri" panose="020F0502020204030204"/>
         <a:ea typeface=""/>
         <a:cs typeface=""/>
-        <a:font script="Jpan" typeface="ＭＳ Ｐゴシック"/>
+        <a:font script="Jpan" typeface="游ゴシック"/>
         <a:font script="Hang" typeface="맑은 고딕"/>
-        <a:font script="Hans" typeface="宋体"/>
+        <a:font script="Hans" typeface="等线"/>
         <a:font script="Hant" typeface="新細明體"/>
         <a:font script="Arab" typeface="Arial"/>
         <a:font script="Hebr" typeface="Arial"/>
@@ -5104,6 +6873,23 @@
         <a:font script="Viet" typeface="Arial"/>
         <a:font script="Uigh" typeface="Microsoft Uighur"/>
         <a:font script="Geor" typeface="Sylfaen"/>
+        <a:font script="Armn" typeface="Arial"/>
+        <a:font script="Bugi" typeface="Leelawadee UI"/>
+        <a:font script="Bopo" typeface="Microsoft JhengHei"/>
+        <a:font script="Java" typeface="Javanese Text"/>
+        <a:font script="Lisu" typeface="Segoe UI"/>
+        <a:font script="Mymr" typeface="Myanmar Text"/>
+        <a:font script="Nkoo" typeface="Ebrima"/>
+        <a:font script="Olck" typeface="Nirmala UI"/>
+        <a:font script="Osma" typeface="Ebrima"/>
+        <a:font script="Phag" typeface="Phagspa"/>
+        <a:font script="Syrn" typeface="Estrangelo Edessa"/>
+        <a:font script="Syrj" typeface="Estrangelo Edessa"/>
+        <a:font script="Syre" typeface="Estrangelo Edessa"/>
+        <a:font script="Sora" typeface="Nirmala UI"/>
+        <a:font script="Tale" typeface="Microsoft Tai Le"/>
+        <a:font script="Talu" typeface="Microsoft New Tai Lue"/>
+        <a:font script="Tfng" typeface="Ebrima"/>
       </a:minorFont>
     </a:fontScheme>
     <a:fmtScheme name="Office">

</xml_diff>

<commit_message>
Update prod 6 format and pdf
</commit_message>
<xml_diff>
--- a/docs/part_6/production_6.pptx
+++ b/docs/part_6/production_6.pptx
@@ -5386,24 +5386,33 @@
           <a:p>
             <a:pPr lvl="0"/>
             <a:r>
+              <a:rPr dirty="0"/>
               <a:t>These notes are based on Chapter 7 of </a:t>
             </a:r>
             <a:r>
-              <a:rPr i="1">
+              <a:rPr i="1" dirty="0">
                 <a:hlinkClick r:id="rId2"/>
               </a:rPr>
               <a:t>Designing Machine Learning Systems</a:t>
             </a:r>
             <a:r>
+              <a:rPr dirty="0"/>
               <a:t>, by </a:t>
             </a:r>
             <a:r>
-              <a:rPr>
+              <a:rPr dirty="0">
                 <a:hlinkClick r:id="rId3"/>
               </a:rPr>
-              <a:t>Chip Huyen</a:t>
-            </a:r>
-            <a:r>
+              <a:t>Chip </a:t>
+            </a:r>
+            <a:r>
+              <a:rPr dirty="0" err="1">
+                <a:hlinkClick r:id="rId3"/>
+              </a:rPr>
+              <a:t>Huyen</a:t>
+            </a:r>
+            <a:r>
+              <a:rPr dirty="0"/>
               <a:t>.</a:t>
             </a:r>
           </a:p>
@@ -5440,7 +5449,31 @@
               <a:rPr sz="1100" dirty="0">
                 <a:latin typeface="Courier"/>
               </a:rPr>
-              <a:t>./notebooks/production_5_model_development.ipynb</a:t>
+              <a:t>./notebooks/production_</a:t>
+            </a:r>
+            <a:r>
+              <a:rPr lang="en-US" sz="1100" dirty="0">
+                <a:latin typeface="Courier"/>
+              </a:rPr>
+              <a:t>6</a:t>
+            </a:r>
+            <a:r>
+              <a:rPr sz="1100" dirty="0">
+                <a:latin typeface="Courier"/>
+              </a:rPr>
+              <a:t>_</a:t>
+            </a:r>
+            <a:r>
+              <a:rPr lang="en-US" sz="1100" dirty="0">
+                <a:latin typeface="Courier"/>
+              </a:rPr>
+              <a:t>deployment</a:t>
+            </a:r>
+            <a:r>
+              <a:rPr sz="1100" dirty="0">
+                <a:latin typeface="Courier"/>
+              </a:rPr>
+              <a:t>.ipynb</a:t>
             </a:r>
           </a:p>
           <a:p>

</xml_diff>